<commit_message>
feat: add more info about this swarm mission
</commit_message>
<xml_diff>
--- a/Indvidualus_darbas/esaSwarm_EEF.pptx
+++ b/Indvidualus_darbas/esaSwarm_EEF.pptx
@@ -7,30 +7,24 @@
     <p:sldMasterId id="2147483707" r:id="rId6"/>
   </p:sldMasterIdLst>
   <p:notesMasterIdLst>
-    <p:notesMasterId r:id="rId25"/>
+    <p:notesMasterId r:id="rId19"/>
   </p:notesMasterIdLst>
   <p:handoutMasterIdLst>
-    <p:handoutMasterId r:id="rId26"/>
+    <p:handoutMasterId r:id="rId20"/>
   </p:handoutMasterIdLst>
   <p:sldIdLst>
     <p:sldId id="256" r:id="rId7"/>
-    <p:sldId id="282" r:id="rId8"/>
-    <p:sldId id="283" r:id="rId9"/>
+    <p:sldId id="283" r:id="rId8"/>
+    <p:sldId id="282" r:id="rId9"/>
     <p:sldId id="281" r:id="rId10"/>
-    <p:sldId id="284" r:id="rId11"/>
+    <p:sldId id="287" r:id="rId11"/>
     <p:sldId id="285" r:id="rId12"/>
-    <p:sldId id="286" r:id="rId13"/>
-    <p:sldId id="287" r:id="rId14"/>
-    <p:sldId id="288" r:id="rId15"/>
-    <p:sldId id="289" r:id="rId16"/>
-    <p:sldId id="290" r:id="rId17"/>
-    <p:sldId id="291" r:id="rId18"/>
-    <p:sldId id="292" r:id="rId19"/>
-    <p:sldId id="293" r:id="rId20"/>
-    <p:sldId id="294" r:id="rId21"/>
-    <p:sldId id="295" r:id="rId22"/>
-    <p:sldId id="296" r:id="rId23"/>
-    <p:sldId id="297" r:id="rId24"/>
+    <p:sldId id="288" r:id="rId13"/>
+    <p:sldId id="289" r:id="rId14"/>
+    <p:sldId id="290" r:id="rId15"/>
+    <p:sldId id="291" r:id="rId16"/>
+    <p:sldId id="296" r:id="rId17"/>
+    <p:sldId id="297" r:id="rId18"/>
   </p:sldIdLst>
   <p:sldSz cx="12192000" cy="6858000"/>
   <p:notesSz cx="6858000" cy="9144000"/>
@@ -4286,7 +4280,7 @@
           <a:p>
             <a:fld id="{72F77756-703A-4C45-96D0-2261A4FADC57}" type="datetimeFigureOut">
               <a:rPr lang="en-US" smtClean="0"/>
-              <a:t>10/27/2023</a:t>
+              <a:t>10/29/2023</a:t>
             </a:fld>
             <a:endParaRPr lang="en-US"/>
           </a:p>
@@ -4464,7 +4458,7 @@
           <a:p>
             <a:fld id="{7E4A7845-6E42-A54B-BDCA-C3518250E7BF}" type="datetimeFigureOut">
               <a:rPr lang="en-US" smtClean="0"/>
-              <a:t>10/27/2023</a:t>
+              <a:t>10/29/2023</a:t>
             </a:fld>
             <a:endParaRPr lang="en-US"/>
           </a:p>
@@ -23345,536 +23339,6 @@
           <a:p>
             <a:r>
               <a:rPr lang="lt-LT" dirty="0"/>
-              <a:t>Radiacijos ir šiluminio vakuumo testai</a:t>
-            </a:r>
-          </a:p>
-        </p:txBody>
-      </p:sp>
-      <p:sp>
-        <p:nvSpPr>
-          <p:cNvPr id="3" name="Text Placeholder 3">
-            <a:extLst>
-              <a:ext uri="{FF2B5EF4-FFF2-40B4-BE49-F238E27FC236}">
-                <a16:creationId xmlns:a16="http://schemas.microsoft.com/office/drawing/2014/main" id="{121F8870-B73B-27B6-5FF2-A04C8774E1AA}"/>
-              </a:ext>
-            </a:extLst>
-          </p:cNvPr>
-          <p:cNvSpPr txBox="1">
-            <a:spLocks/>
-          </p:cNvSpPr>
-          <p:nvPr/>
-        </p:nvSpPr>
-        <p:spPr>
-          <a:xfrm>
-            <a:off x="72736" y="1735282"/>
-            <a:ext cx="6993081" cy="4831774"/>
-          </a:xfrm>
-          <a:prstGeom prst="rect">
-            <a:avLst/>
-          </a:prstGeom>
-        </p:spPr>
-        <p:txBody>
-          <a:bodyPr anchor="b"/>
-          <a:lstStyle>
-            <a:lvl1pPr marL="0" indent="0" algn="l" defTabSz="914400" rtl="0" eaLnBrk="1" latinLnBrk="0" hangingPunct="1">
-              <a:lnSpc>
-                <a:spcPct val="110000"/>
-              </a:lnSpc>
-              <a:spcBef>
-                <a:spcPts val="0"/>
-              </a:spcBef>
-              <a:spcAft>
-                <a:spcPts val="0"/>
-              </a:spcAft>
-              <a:buFont typeface="+mj-lt"/>
-              <a:buNone/>
-              <a:defRPr sz="2200" b="1" i="0" kern="1200">
-                <a:solidFill>
-                  <a:schemeClr val="bg1"/>
-                </a:solidFill>
-                <a:latin typeface="Arial" panose="020B0604020202020204" pitchFamily="34" charset="0"/>
-                <a:ea typeface="Inter Medium" panose="020B0502030000000004" pitchFamily="34" charset="0"/>
-                <a:cs typeface="Arial" panose="020B0604020202020204" pitchFamily="34" charset="0"/>
-              </a:defRPr>
-            </a:lvl1pPr>
-            <a:lvl2pPr marL="685800" indent="-228600" algn="l" defTabSz="914400" rtl="0" eaLnBrk="1" latinLnBrk="0" hangingPunct="1">
-              <a:lnSpc>
-                <a:spcPct val="90000"/>
-              </a:lnSpc>
-              <a:spcBef>
-                <a:spcPts val="500"/>
-              </a:spcBef>
-              <a:buFont typeface="Arial" panose="020B0604020202020204" pitchFamily="34" charset="0"/>
-              <a:buChar char="•"/>
-              <a:defRPr sz="2400" kern="1200">
-                <a:solidFill>
-                  <a:schemeClr val="tx1"/>
-                </a:solidFill>
-                <a:latin typeface="+mn-lt"/>
-                <a:ea typeface="+mn-ea"/>
-                <a:cs typeface="+mn-cs"/>
-              </a:defRPr>
-            </a:lvl2pPr>
-            <a:lvl3pPr marL="1143000" indent="-228600" algn="l" defTabSz="914400" rtl="0" eaLnBrk="1" latinLnBrk="0" hangingPunct="1">
-              <a:lnSpc>
-                <a:spcPct val="90000"/>
-              </a:lnSpc>
-              <a:spcBef>
-                <a:spcPts val="500"/>
-              </a:spcBef>
-              <a:buFont typeface="Arial" panose="020B0604020202020204" pitchFamily="34" charset="0"/>
-              <a:buChar char="•"/>
-              <a:defRPr sz="2000" kern="1200">
-                <a:solidFill>
-                  <a:schemeClr val="tx1"/>
-                </a:solidFill>
-                <a:latin typeface="+mn-lt"/>
-                <a:ea typeface="+mn-ea"/>
-                <a:cs typeface="+mn-cs"/>
-              </a:defRPr>
-            </a:lvl3pPr>
-            <a:lvl4pPr marL="1600200" indent="-228600" algn="l" defTabSz="914400" rtl="0" eaLnBrk="1" latinLnBrk="0" hangingPunct="1">
-              <a:lnSpc>
-                <a:spcPct val="90000"/>
-              </a:lnSpc>
-              <a:spcBef>
-                <a:spcPts val="500"/>
-              </a:spcBef>
-              <a:buFont typeface="Arial" panose="020B0604020202020204" pitchFamily="34" charset="0"/>
-              <a:buChar char="•"/>
-              <a:defRPr sz="1800" kern="1200">
-                <a:solidFill>
-                  <a:schemeClr val="tx1"/>
-                </a:solidFill>
-                <a:latin typeface="+mn-lt"/>
-                <a:ea typeface="+mn-ea"/>
-                <a:cs typeface="+mn-cs"/>
-              </a:defRPr>
-            </a:lvl4pPr>
-            <a:lvl5pPr marL="2057400" indent="-228600" algn="l" defTabSz="914400" rtl="0" eaLnBrk="1" latinLnBrk="0" hangingPunct="1">
-              <a:lnSpc>
-                <a:spcPct val="90000"/>
-              </a:lnSpc>
-              <a:spcBef>
-                <a:spcPts val="500"/>
-              </a:spcBef>
-              <a:buFont typeface="Arial" panose="020B0604020202020204" pitchFamily="34" charset="0"/>
-              <a:buChar char="•"/>
-              <a:defRPr sz="1800" kern="1200">
-                <a:solidFill>
-                  <a:schemeClr val="tx1"/>
-                </a:solidFill>
-                <a:latin typeface="+mn-lt"/>
-                <a:ea typeface="+mn-ea"/>
-                <a:cs typeface="+mn-cs"/>
-              </a:defRPr>
-            </a:lvl5pPr>
-            <a:lvl6pPr marL="2514600" indent="-228600" algn="l" defTabSz="914400" rtl="0" eaLnBrk="1" latinLnBrk="0" hangingPunct="1">
-              <a:lnSpc>
-                <a:spcPct val="90000"/>
-              </a:lnSpc>
-              <a:spcBef>
-                <a:spcPts val="500"/>
-              </a:spcBef>
-              <a:buFont typeface="Arial" panose="020B0604020202020204" pitchFamily="34" charset="0"/>
-              <a:buChar char="•"/>
-              <a:defRPr sz="1800" kern="1200">
-                <a:solidFill>
-                  <a:schemeClr val="tx1"/>
-                </a:solidFill>
-                <a:latin typeface="+mn-lt"/>
-                <a:ea typeface="+mn-ea"/>
-                <a:cs typeface="+mn-cs"/>
-              </a:defRPr>
-            </a:lvl6pPr>
-            <a:lvl7pPr marL="2971800" indent="-228600" algn="l" defTabSz="914400" rtl="0" eaLnBrk="1" latinLnBrk="0" hangingPunct="1">
-              <a:lnSpc>
-                <a:spcPct val="90000"/>
-              </a:lnSpc>
-              <a:spcBef>
-                <a:spcPts val="500"/>
-              </a:spcBef>
-              <a:buFont typeface="Arial" panose="020B0604020202020204" pitchFamily="34" charset="0"/>
-              <a:buChar char="•"/>
-              <a:defRPr sz="1800" kern="1200">
-                <a:solidFill>
-                  <a:schemeClr val="tx1"/>
-                </a:solidFill>
-                <a:latin typeface="+mn-lt"/>
-                <a:ea typeface="+mn-ea"/>
-                <a:cs typeface="+mn-cs"/>
-              </a:defRPr>
-            </a:lvl7pPr>
-            <a:lvl8pPr marL="3429000" indent="-228600" algn="l" defTabSz="914400" rtl="0" eaLnBrk="1" latinLnBrk="0" hangingPunct="1">
-              <a:lnSpc>
-                <a:spcPct val="90000"/>
-              </a:lnSpc>
-              <a:spcBef>
-                <a:spcPts val="500"/>
-              </a:spcBef>
-              <a:buFont typeface="Arial" panose="020B0604020202020204" pitchFamily="34" charset="0"/>
-              <a:buChar char="•"/>
-              <a:defRPr sz="1800" kern="1200">
-                <a:solidFill>
-                  <a:schemeClr val="tx1"/>
-                </a:solidFill>
-                <a:latin typeface="+mn-lt"/>
-                <a:ea typeface="+mn-ea"/>
-                <a:cs typeface="+mn-cs"/>
-              </a:defRPr>
-            </a:lvl8pPr>
-            <a:lvl9pPr marL="3886200" indent="-228600" algn="l" defTabSz="914400" rtl="0" eaLnBrk="1" latinLnBrk="0" hangingPunct="1">
-              <a:lnSpc>
-                <a:spcPct val="90000"/>
-              </a:lnSpc>
-              <a:spcBef>
-                <a:spcPts val="500"/>
-              </a:spcBef>
-              <a:buFont typeface="Arial" panose="020B0604020202020204" pitchFamily="34" charset="0"/>
-              <a:buChar char="•"/>
-              <a:defRPr sz="1800" kern="1200">
-                <a:solidFill>
-                  <a:schemeClr val="tx1"/>
-                </a:solidFill>
-                <a:latin typeface="+mn-lt"/>
-                <a:ea typeface="+mn-ea"/>
-                <a:cs typeface="+mn-cs"/>
-              </a:defRPr>
-            </a:lvl9pPr>
-          </a:lstStyle>
-          <a:p>
-            <a:pPr marL="342900" indent="-342900" algn="just">
-              <a:buFont typeface="Arial" panose="020B0604020202020204" pitchFamily="34" charset="0"/>
-              <a:buChar char="•"/>
-            </a:pPr>
-            <a:r>
-              <a:rPr lang="lt-LT" sz="2000" b="0" dirty="0"/>
-              <a:t>Vieno įvykio efektai yra labai pavojingi gali sukelti bitų klaidas arba įrenginio užblokavimą (angl. </a:t>
-            </a:r>
-            <a:r>
-              <a:rPr lang="lt-LT" sz="2000" b="0" dirty="0" err="1"/>
-              <a:t>latch-up</a:t>
-            </a:r>
-            <a:r>
-              <a:rPr lang="lt-LT" sz="2000" b="0" dirty="0"/>
-              <a:t>). </a:t>
-            </a:r>
-          </a:p>
-          <a:p>
-            <a:pPr marL="342900" indent="-342900" algn="just">
-              <a:buFont typeface="Arial" panose="020B0604020202020204" pitchFamily="34" charset="0"/>
-              <a:buChar char="•"/>
-            </a:pPr>
-            <a:r>
-              <a:rPr lang="lt-LT" sz="2000" b="0" dirty="0"/>
-              <a:t>Mažieji palydovai dažniausiai yra surenkami iš </a:t>
-            </a:r>
-            <a:r>
-              <a:rPr lang="lt-LT" sz="2000" dirty="0"/>
-              <a:t>įprastų elektronikos</a:t>
-            </a:r>
-            <a:r>
-              <a:rPr lang="lt-LT" sz="2000" b="0" dirty="0"/>
-              <a:t> (angl. </a:t>
-            </a:r>
-            <a:r>
-              <a:rPr lang="lt-LT" sz="2000" b="0" dirty="0" err="1"/>
-              <a:t>comercial</a:t>
-            </a:r>
-            <a:r>
-              <a:rPr lang="lt-LT" sz="2000" b="0" dirty="0"/>
-              <a:t> </a:t>
-            </a:r>
-            <a:r>
-              <a:rPr lang="lt-LT" sz="2000" b="0" dirty="0" err="1"/>
-              <a:t>of</a:t>
-            </a:r>
-            <a:r>
-              <a:rPr lang="lt-LT" sz="2000" b="0" dirty="0"/>
-              <a:t> </a:t>
-            </a:r>
-            <a:r>
-              <a:rPr lang="lt-LT" sz="2000" b="0" dirty="0" err="1"/>
-              <a:t>the</a:t>
-            </a:r>
-            <a:r>
-              <a:rPr lang="lt-LT" sz="2000" b="0" dirty="0"/>
-              <a:t> </a:t>
-            </a:r>
-            <a:r>
-              <a:rPr lang="lt-LT" sz="2000" b="0" dirty="0" err="1"/>
-              <a:t>shefl</a:t>
-            </a:r>
-            <a:r>
-              <a:rPr lang="lt-LT" sz="2000" b="0" dirty="0"/>
-              <a:t> – COTS), </a:t>
-            </a:r>
-            <a:r>
-              <a:rPr lang="lt-LT" sz="2000" dirty="0"/>
-              <a:t>komponentų</a:t>
-            </a:r>
-            <a:r>
-              <a:rPr lang="lt-LT" sz="2000" b="0" dirty="0"/>
-              <a:t> (siekiant užtikrinti greitą gamybos procesą ir maža kainą), jie nėra išskirtinai atsparūs radiacijai.</a:t>
-            </a:r>
-          </a:p>
-          <a:p>
-            <a:pPr algn="just"/>
-            <a:endParaRPr lang="lt-LT" sz="2000" b="0" dirty="0"/>
-          </a:p>
-          <a:p>
-            <a:pPr marL="342900" indent="-342900" algn="just">
-              <a:buFont typeface="Arial" panose="020B0604020202020204" pitchFamily="34" charset="0"/>
-              <a:buChar char="•"/>
-            </a:pPr>
-            <a:r>
-              <a:rPr lang="lt-LT" sz="2000" b="0" dirty="0" err="1"/>
-              <a:t>Tvacc</a:t>
-            </a:r>
-            <a:r>
-              <a:rPr lang="lt-LT" sz="2000" b="0" dirty="0"/>
-              <a:t> testai - patikrinti palydovo veikimą kosminėje aplinkoje kuri pasižymi </a:t>
-            </a:r>
-            <a:r>
-              <a:rPr lang="lt-LT" sz="2000" dirty="0"/>
-              <a:t>dideliais temperatūros svyravimais.</a:t>
-            </a:r>
-            <a:r>
-              <a:rPr lang="lt-LT" sz="2000" b="0" dirty="0"/>
-              <a:t> </a:t>
-            </a:r>
-          </a:p>
-          <a:p>
-            <a:pPr marL="342900" indent="-342900" algn="just">
-              <a:buFont typeface="Arial" panose="020B0604020202020204" pitchFamily="34" charset="0"/>
-              <a:buChar char="•"/>
-            </a:pPr>
-            <a:r>
-              <a:rPr lang="lt-LT" sz="2000" b="0" dirty="0"/>
-              <a:t>Kitas svarbus veiksnys kosmoso pramonėje yra dujų pasišalinimo procesas (angl. </a:t>
-            </a:r>
-            <a:r>
-              <a:rPr lang="lt-LT" sz="2000" dirty="0" err="1"/>
-              <a:t>outgassing</a:t>
-            </a:r>
-            <a:r>
-              <a:rPr lang="lt-LT" sz="2000" b="0" dirty="0"/>
-              <a:t>) </a:t>
-            </a:r>
-          </a:p>
-          <a:p>
-            <a:pPr algn="just"/>
-            <a:endParaRPr lang="lt-LT" sz="2000" b="0" dirty="0"/>
-          </a:p>
-          <a:p>
-            <a:pPr algn="just"/>
-            <a:r>
-              <a:rPr lang="lt-LT" sz="2000" b="0" dirty="0"/>
-              <a:t> </a:t>
-            </a:r>
-          </a:p>
-        </p:txBody>
-      </p:sp>
-      <p:pic>
-        <p:nvPicPr>
-          <p:cNvPr id="4" name="Picture 3">
-            <a:extLst>
-              <a:ext uri="{FF2B5EF4-FFF2-40B4-BE49-F238E27FC236}">
-                <a16:creationId xmlns:a16="http://schemas.microsoft.com/office/drawing/2014/main" id="{D5E25678-B7DA-357F-1DBC-A7E42BC5D381}"/>
-              </a:ext>
-            </a:extLst>
-          </p:cNvPr>
-          <p:cNvPicPr>
-            <a:picLocks noChangeAspect="1"/>
-          </p:cNvPicPr>
-          <p:nvPr/>
-        </p:nvPicPr>
-        <p:blipFill>
-          <a:blip r:embed="rId2"/>
-          <a:stretch>
-            <a:fillRect/>
-          </a:stretch>
-        </p:blipFill>
-        <p:spPr>
-          <a:xfrm>
-            <a:off x="7183054" y="1647541"/>
-            <a:ext cx="4163817" cy="5210459"/>
-          </a:xfrm>
-          <a:prstGeom prst="rect">
-            <a:avLst/>
-          </a:prstGeom>
-        </p:spPr>
-      </p:pic>
-    </p:spTree>
-    <p:extLst>
-      <p:ext uri="{BB962C8B-B14F-4D97-AF65-F5344CB8AC3E}">
-        <p14:creationId xmlns:p14="http://schemas.microsoft.com/office/powerpoint/2010/main" val="2236282946"/>
-      </p:ext>
-    </p:extLst>
-  </p:cSld>
-  <p:clrMapOvr>
-    <a:masterClrMapping/>
-  </p:clrMapOvr>
-</p:sld>
-</file>
-
-<file path=ppt/slides/slide11.xml><?xml version="1.0" encoding="utf-8"?>
-<p:sld xmlns:a="http://schemas.openxmlformats.org/drawingml/2006/main" xmlns:r="http://schemas.openxmlformats.org/officeDocument/2006/relationships" xmlns:p="http://schemas.openxmlformats.org/presentationml/2006/main">
-  <p:cSld>
-    <p:spTree>
-      <p:nvGrpSpPr>
-        <p:cNvPr id="1" name=""/>
-        <p:cNvGrpSpPr/>
-        <p:nvPr/>
-      </p:nvGrpSpPr>
-      <p:grpSpPr>
-        <a:xfrm>
-          <a:off x="0" y="0"/>
-          <a:ext cx="0" cy="0"/>
-          <a:chOff x="0" y="0"/>
-          <a:chExt cx="0" cy="0"/>
-        </a:xfrm>
-      </p:grpSpPr>
-      <p:sp>
-        <p:nvSpPr>
-          <p:cNvPr id="2" name="Text Placeholder 1">
-            <a:extLst>
-              <a:ext uri="{FF2B5EF4-FFF2-40B4-BE49-F238E27FC236}">
-                <a16:creationId xmlns:a16="http://schemas.microsoft.com/office/drawing/2014/main" id="{4BF41ED2-32ED-3FBD-3714-A5B7C2499D70}"/>
-              </a:ext>
-            </a:extLst>
-          </p:cNvPr>
-          <p:cNvSpPr>
-            <a:spLocks noGrp="1"/>
-          </p:cNvSpPr>
-          <p:nvPr>
-            <p:ph type="body" sz="quarter" idx="11"/>
-          </p:nvPr>
-        </p:nvSpPr>
-        <p:spPr/>
-        <p:txBody>
-          <a:bodyPr/>
-          <a:lstStyle/>
-          <a:p>
-            <a:r>
-              <a:rPr lang="en-US" dirty="0"/>
-              <a:t>,,</a:t>
-            </a:r>
-            <a:r>
-              <a:rPr lang="en-US" dirty="0" err="1"/>
-              <a:t>Nanoavionics</a:t>
-            </a:r>
-            <a:r>
-              <a:rPr lang="en-US" dirty="0"/>
-              <a:t>”</a:t>
-            </a:r>
-            <a:r>
-              <a:rPr lang="lt-LT" dirty="0"/>
-              <a:t> įmonės praktikos</a:t>
-            </a:r>
-          </a:p>
-        </p:txBody>
-      </p:sp>
-      <p:pic>
-        <p:nvPicPr>
-          <p:cNvPr id="2050" name="Picture 2" descr="Satellite Snaps Wowza Space Selfie With Off-the-Shelf Camera - CNET">
-            <a:extLst>
-              <a:ext uri="{FF2B5EF4-FFF2-40B4-BE49-F238E27FC236}">
-                <a16:creationId xmlns:a16="http://schemas.microsoft.com/office/drawing/2014/main" id="{7DFB4040-C637-7EEB-B178-9348B041508A}"/>
-              </a:ext>
-            </a:extLst>
-          </p:cNvPr>
-          <p:cNvPicPr>
-            <a:picLocks noChangeAspect="1" noChangeArrowheads="1"/>
-          </p:cNvPicPr>
-          <p:nvPr/>
-        </p:nvPicPr>
-        <p:blipFill>
-          <a:blip r:embed="rId2">
-            <a:extLst>
-              <a:ext uri="{28A0092B-C50C-407E-A947-70E740481C1C}">
-                <a14:useLocalDpi xmlns:a14="http://schemas.microsoft.com/office/drawing/2010/main" val="0"/>
-              </a:ext>
-            </a:extLst>
-          </a:blip>
-          <a:srcRect/>
-          <a:stretch>
-            <a:fillRect/>
-          </a:stretch>
-        </p:blipFill>
-        <p:spPr bwMode="auto">
-          <a:xfrm>
-            <a:off x="30051" y="1660921"/>
-            <a:ext cx="9239251" cy="5197079"/>
-          </a:xfrm>
-          <a:prstGeom prst="rect">
-            <a:avLst/>
-          </a:prstGeom>
-          <a:noFill/>
-          <a:extLst>
-            <a:ext uri="{909E8E84-426E-40DD-AFC4-6F175D3DCCD1}">
-              <a14:hiddenFill xmlns:a14="http://schemas.microsoft.com/office/drawing/2010/main">
-                <a:solidFill>
-                  <a:srgbClr val="FFFFFF"/>
-                </a:solidFill>
-              </a14:hiddenFill>
-            </a:ext>
-          </a:extLst>
-        </p:spPr>
-      </p:pic>
-    </p:spTree>
-    <p:extLst>
-      <p:ext uri="{BB962C8B-B14F-4D97-AF65-F5344CB8AC3E}">
-        <p14:creationId xmlns:p14="http://schemas.microsoft.com/office/powerpoint/2010/main" val="1665262859"/>
-      </p:ext>
-    </p:extLst>
-  </p:cSld>
-  <p:clrMapOvr>
-    <a:masterClrMapping/>
-  </p:clrMapOvr>
-</p:sld>
-</file>
-
-<file path=ppt/slides/slide12.xml><?xml version="1.0" encoding="utf-8"?>
-<p:sld xmlns:a="http://schemas.openxmlformats.org/drawingml/2006/main" xmlns:r="http://schemas.openxmlformats.org/officeDocument/2006/relationships" xmlns:p="http://schemas.openxmlformats.org/presentationml/2006/main">
-  <p:cSld>
-    <p:spTree>
-      <p:nvGrpSpPr>
-        <p:cNvPr id="1" name=""/>
-        <p:cNvGrpSpPr/>
-        <p:nvPr/>
-      </p:nvGrpSpPr>
-      <p:grpSpPr>
-        <a:xfrm>
-          <a:off x="0" y="0"/>
-          <a:ext cx="0" cy="0"/>
-          <a:chOff x="0" y="0"/>
-          <a:chExt cx="0" cy="0"/>
-        </a:xfrm>
-      </p:grpSpPr>
-      <p:sp>
-        <p:nvSpPr>
-          <p:cNvPr id="2" name="Text Placeholder 1">
-            <a:extLst>
-              <a:ext uri="{FF2B5EF4-FFF2-40B4-BE49-F238E27FC236}">
-                <a16:creationId xmlns:a16="http://schemas.microsoft.com/office/drawing/2014/main" id="{4BF41ED2-32ED-3FBD-3714-A5B7C2499D70}"/>
-              </a:ext>
-            </a:extLst>
-          </p:cNvPr>
-          <p:cNvSpPr>
-            <a:spLocks noGrp="1"/>
-          </p:cNvSpPr>
-          <p:nvPr>
-            <p:ph type="body" sz="quarter" idx="11"/>
-          </p:nvPr>
-        </p:nvSpPr>
-        <p:spPr/>
-        <p:txBody>
-          <a:bodyPr/>
-          <a:lstStyle/>
-          <a:p>
-            <a:r>
-              <a:rPr lang="lt-LT" dirty="0"/>
               <a:t>Aparatūriniai sprendimai</a:t>
             </a:r>
           </a:p>
@@ -24213,7 +23677,7 @@
 </p:sld>
 </file>
 
-<file path=ppt/slides/slide13.xml><?xml version="1.0" encoding="utf-8"?>
+<file path=ppt/slides/slide11.xml><?xml version="1.0" encoding="utf-8"?>
 <p:sld xmlns:a="http://schemas.openxmlformats.org/drawingml/2006/main" xmlns:r="http://schemas.openxmlformats.org/officeDocument/2006/relationships" xmlns:p="http://schemas.openxmlformats.org/presentationml/2006/main">
   <p:cSld>
     <p:spTree>
@@ -24252,1407 +23716,11 @@
           <a:lstStyle/>
           <a:p>
             <a:r>
-              <a:rPr lang="lt-LT" dirty="0"/>
-              <a:t>Programinės įrangos sprendimai</a:t>
-            </a:r>
-          </a:p>
-        </p:txBody>
-      </p:sp>
-      <p:sp>
-        <p:nvSpPr>
-          <p:cNvPr id="3" name="Text Placeholder 3">
-            <a:extLst>
-              <a:ext uri="{FF2B5EF4-FFF2-40B4-BE49-F238E27FC236}">
-                <a16:creationId xmlns:a16="http://schemas.microsoft.com/office/drawing/2014/main" id="{121F8870-B73B-27B6-5FF2-A04C8774E1AA}"/>
-              </a:ext>
-            </a:extLst>
-          </p:cNvPr>
-          <p:cNvSpPr txBox="1">
-            <a:spLocks/>
-          </p:cNvSpPr>
-          <p:nvPr/>
-        </p:nvSpPr>
-        <p:spPr>
-          <a:xfrm>
-            <a:off x="459102" y="1606493"/>
-            <a:ext cx="6791703" cy="995039"/>
-          </a:xfrm>
-          <a:prstGeom prst="rect">
-            <a:avLst/>
-          </a:prstGeom>
-        </p:spPr>
-        <p:txBody>
-          <a:bodyPr anchor="b"/>
-          <a:lstStyle>
-            <a:lvl1pPr marL="0" indent="0" algn="l" defTabSz="914400" rtl="0" eaLnBrk="1" latinLnBrk="0" hangingPunct="1">
-              <a:lnSpc>
-                <a:spcPct val="110000"/>
-              </a:lnSpc>
-              <a:spcBef>
-                <a:spcPts val="0"/>
-              </a:spcBef>
-              <a:spcAft>
-                <a:spcPts val="0"/>
-              </a:spcAft>
-              <a:buFont typeface="+mj-lt"/>
-              <a:buNone/>
-              <a:defRPr sz="2200" b="1" i="0" kern="1200">
-                <a:solidFill>
-                  <a:schemeClr val="bg1"/>
-                </a:solidFill>
-                <a:latin typeface="Arial" panose="020B0604020202020204" pitchFamily="34" charset="0"/>
-                <a:ea typeface="Inter Medium" panose="020B0502030000000004" pitchFamily="34" charset="0"/>
-                <a:cs typeface="Arial" panose="020B0604020202020204" pitchFamily="34" charset="0"/>
-              </a:defRPr>
-            </a:lvl1pPr>
-            <a:lvl2pPr marL="685800" indent="-228600" algn="l" defTabSz="914400" rtl="0" eaLnBrk="1" latinLnBrk="0" hangingPunct="1">
-              <a:lnSpc>
-                <a:spcPct val="90000"/>
-              </a:lnSpc>
-              <a:spcBef>
-                <a:spcPts val="500"/>
-              </a:spcBef>
-              <a:buFont typeface="Arial" panose="020B0604020202020204" pitchFamily="34" charset="0"/>
-              <a:buChar char="•"/>
-              <a:defRPr sz="2400" kern="1200">
-                <a:solidFill>
-                  <a:schemeClr val="tx1"/>
-                </a:solidFill>
-                <a:latin typeface="+mn-lt"/>
-                <a:ea typeface="+mn-ea"/>
-                <a:cs typeface="+mn-cs"/>
-              </a:defRPr>
-            </a:lvl2pPr>
-            <a:lvl3pPr marL="1143000" indent="-228600" algn="l" defTabSz="914400" rtl="0" eaLnBrk="1" latinLnBrk="0" hangingPunct="1">
-              <a:lnSpc>
-                <a:spcPct val="90000"/>
-              </a:lnSpc>
-              <a:spcBef>
-                <a:spcPts val="500"/>
-              </a:spcBef>
-              <a:buFont typeface="Arial" panose="020B0604020202020204" pitchFamily="34" charset="0"/>
-              <a:buChar char="•"/>
-              <a:defRPr sz="2000" kern="1200">
-                <a:solidFill>
-                  <a:schemeClr val="tx1"/>
-                </a:solidFill>
-                <a:latin typeface="+mn-lt"/>
-                <a:ea typeface="+mn-ea"/>
-                <a:cs typeface="+mn-cs"/>
-              </a:defRPr>
-            </a:lvl3pPr>
-            <a:lvl4pPr marL="1600200" indent="-228600" algn="l" defTabSz="914400" rtl="0" eaLnBrk="1" latinLnBrk="0" hangingPunct="1">
-              <a:lnSpc>
-                <a:spcPct val="90000"/>
-              </a:lnSpc>
-              <a:spcBef>
-                <a:spcPts val="500"/>
-              </a:spcBef>
-              <a:buFont typeface="Arial" panose="020B0604020202020204" pitchFamily="34" charset="0"/>
-              <a:buChar char="•"/>
-              <a:defRPr sz="1800" kern="1200">
-                <a:solidFill>
-                  <a:schemeClr val="tx1"/>
-                </a:solidFill>
-                <a:latin typeface="+mn-lt"/>
-                <a:ea typeface="+mn-ea"/>
-                <a:cs typeface="+mn-cs"/>
-              </a:defRPr>
-            </a:lvl4pPr>
-            <a:lvl5pPr marL="2057400" indent="-228600" algn="l" defTabSz="914400" rtl="0" eaLnBrk="1" latinLnBrk="0" hangingPunct="1">
-              <a:lnSpc>
-                <a:spcPct val="90000"/>
-              </a:lnSpc>
-              <a:spcBef>
-                <a:spcPts val="500"/>
-              </a:spcBef>
-              <a:buFont typeface="Arial" panose="020B0604020202020204" pitchFamily="34" charset="0"/>
-              <a:buChar char="•"/>
-              <a:defRPr sz="1800" kern="1200">
-                <a:solidFill>
-                  <a:schemeClr val="tx1"/>
-                </a:solidFill>
-                <a:latin typeface="+mn-lt"/>
-                <a:ea typeface="+mn-ea"/>
-                <a:cs typeface="+mn-cs"/>
-              </a:defRPr>
-            </a:lvl5pPr>
-            <a:lvl6pPr marL="2514600" indent="-228600" algn="l" defTabSz="914400" rtl="0" eaLnBrk="1" latinLnBrk="0" hangingPunct="1">
-              <a:lnSpc>
-                <a:spcPct val="90000"/>
-              </a:lnSpc>
-              <a:spcBef>
-                <a:spcPts val="500"/>
-              </a:spcBef>
-              <a:buFont typeface="Arial" panose="020B0604020202020204" pitchFamily="34" charset="0"/>
-              <a:buChar char="•"/>
-              <a:defRPr sz="1800" kern="1200">
-                <a:solidFill>
-                  <a:schemeClr val="tx1"/>
-                </a:solidFill>
-                <a:latin typeface="+mn-lt"/>
-                <a:ea typeface="+mn-ea"/>
-                <a:cs typeface="+mn-cs"/>
-              </a:defRPr>
-            </a:lvl6pPr>
-            <a:lvl7pPr marL="2971800" indent="-228600" algn="l" defTabSz="914400" rtl="0" eaLnBrk="1" latinLnBrk="0" hangingPunct="1">
-              <a:lnSpc>
-                <a:spcPct val="90000"/>
-              </a:lnSpc>
-              <a:spcBef>
-                <a:spcPts val="500"/>
-              </a:spcBef>
-              <a:buFont typeface="Arial" panose="020B0604020202020204" pitchFamily="34" charset="0"/>
-              <a:buChar char="•"/>
-              <a:defRPr sz="1800" kern="1200">
-                <a:solidFill>
-                  <a:schemeClr val="tx1"/>
-                </a:solidFill>
-                <a:latin typeface="+mn-lt"/>
-                <a:ea typeface="+mn-ea"/>
-                <a:cs typeface="+mn-cs"/>
-              </a:defRPr>
-            </a:lvl7pPr>
-            <a:lvl8pPr marL="3429000" indent="-228600" algn="l" defTabSz="914400" rtl="0" eaLnBrk="1" latinLnBrk="0" hangingPunct="1">
-              <a:lnSpc>
-                <a:spcPct val="90000"/>
-              </a:lnSpc>
-              <a:spcBef>
-                <a:spcPts val="500"/>
-              </a:spcBef>
-              <a:buFont typeface="Arial" panose="020B0604020202020204" pitchFamily="34" charset="0"/>
-              <a:buChar char="•"/>
-              <a:defRPr sz="1800" kern="1200">
-                <a:solidFill>
-                  <a:schemeClr val="tx1"/>
-                </a:solidFill>
-                <a:latin typeface="+mn-lt"/>
-                <a:ea typeface="+mn-ea"/>
-                <a:cs typeface="+mn-cs"/>
-              </a:defRPr>
-            </a:lvl8pPr>
-            <a:lvl9pPr marL="3886200" indent="-228600" algn="l" defTabSz="914400" rtl="0" eaLnBrk="1" latinLnBrk="0" hangingPunct="1">
-              <a:lnSpc>
-                <a:spcPct val="90000"/>
-              </a:lnSpc>
-              <a:spcBef>
-                <a:spcPts val="500"/>
-              </a:spcBef>
-              <a:buFont typeface="Arial" panose="020B0604020202020204" pitchFamily="34" charset="0"/>
-              <a:buChar char="•"/>
-              <a:defRPr sz="1800" kern="1200">
-                <a:solidFill>
-                  <a:schemeClr val="tx1"/>
-                </a:solidFill>
-                <a:latin typeface="+mn-lt"/>
-                <a:ea typeface="+mn-ea"/>
-                <a:cs typeface="+mn-cs"/>
-              </a:defRPr>
-            </a:lvl9pPr>
-          </a:lstStyle>
-          <a:p>
-            <a:pPr algn="just"/>
-            <a:r>
-              <a:rPr lang="pt-BR" sz="2000" b="0" dirty="0"/>
-              <a:t>Programinės įrangos kūrimo procesas</a:t>
-            </a:r>
-            <a:endParaRPr lang="lt-LT" sz="2000" b="0" dirty="0"/>
-          </a:p>
-          <a:p>
-            <a:pPr algn="just"/>
-            <a:r>
-              <a:rPr lang="lt-LT" sz="2000" b="0" dirty="0"/>
-              <a:t>Kodo peržiūros / planavimas</a:t>
-            </a:r>
-          </a:p>
-        </p:txBody>
-      </p:sp>
-      <p:pic>
-        <p:nvPicPr>
-          <p:cNvPr id="7" name="Picture 6">
-            <a:extLst>
-              <a:ext uri="{FF2B5EF4-FFF2-40B4-BE49-F238E27FC236}">
-                <a16:creationId xmlns:a16="http://schemas.microsoft.com/office/drawing/2014/main" id="{B6F39BCC-2654-564A-5534-082CFF4065CD}"/>
-              </a:ext>
-            </a:extLst>
-          </p:cNvPr>
-          <p:cNvPicPr>
-            <a:picLocks noChangeAspect="1"/>
-          </p:cNvPicPr>
-          <p:nvPr/>
-        </p:nvPicPr>
-        <p:blipFill>
-          <a:blip r:embed="rId2"/>
-          <a:stretch>
-            <a:fillRect/>
-          </a:stretch>
-        </p:blipFill>
-        <p:spPr>
-          <a:xfrm>
-            <a:off x="1429920" y="3028142"/>
-            <a:ext cx="8978606" cy="3829858"/>
-          </a:xfrm>
-          <a:prstGeom prst="rect">
-            <a:avLst/>
-          </a:prstGeom>
-        </p:spPr>
-      </p:pic>
-    </p:spTree>
-    <p:extLst>
-      <p:ext uri="{BB962C8B-B14F-4D97-AF65-F5344CB8AC3E}">
-        <p14:creationId xmlns:p14="http://schemas.microsoft.com/office/powerpoint/2010/main" val="1684090468"/>
-      </p:ext>
-    </p:extLst>
-  </p:cSld>
-  <p:clrMapOvr>
-    <a:masterClrMapping/>
-  </p:clrMapOvr>
-</p:sld>
-</file>
-
-<file path=ppt/slides/slide14.xml><?xml version="1.0" encoding="utf-8"?>
-<p:sld xmlns:a="http://schemas.openxmlformats.org/drawingml/2006/main" xmlns:r="http://schemas.openxmlformats.org/officeDocument/2006/relationships" xmlns:p="http://schemas.openxmlformats.org/presentationml/2006/main">
-  <p:cSld>
-    <p:spTree>
-      <p:nvGrpSpPr>
-        <p:cNvPr id="1" name=""/>
-        <p:cNvGrpSpPr/>
-        <p:nvPr/>
-      </p:nvGrpSpPr>
-      <p:grpSpPr>
-        <a:xfrm>
-          <a:off x="0" y="0"/>
-          <a:ext cx="0" cy="0"/>
-          <a:chOff x="0" y="0"/>
-          <a:chExt cx="0" cy="0"/>
-        </a:xfrm>
-      </p:grpSpPr>
-      <p:sp>
-        <p:nvSpPr>
-          <p:cNvPr id="2" name="Text Placeholder 1">
-            <a:extLst>
-              <a:ext uri="{FF2B5EF4-FFF2-40B4-BE49-F238E27FC236}">
-                <a16:creationId xmlns:a16="http://schemas.microsoft.com/office/drawing/2014/main" id="{4BF41ED2-32ED-3FBD-3714-A5B7C2499D70}"/>
-              </a:ext>
-            </a:extLst>
-          </p:cNvPr>
-          <p:cNvSpPr>
-            <a:spLocks noGrp="1"/>
-          </p:cNvSpPr>
-          <p:nvPr>
-            <p:ph type="body" sz="quarter" idx="11"/>
-          </p:nvPr>
-        </p:nvSpPr>
-        <p:spPr/>
-        <p:txBody>
-          <a:bodyPr/>
-          <a:lstStyle/>
-          <a:p>
-            <a:r>
-              <a:rPr lang="lt-LT" dirty="0"/>
-              <a:t>Integraciniai testai</a:t>
-            </a:r>
-          </a:p>
-        </p:txBody>
-      </p:sp>
-      <p:sp>
-        <p:nvSpPr>
-          <p:cNvPr id="3" name="Text Placeholder 3">
-            <a:extLst>
-              <a:ext uri="{FF2B5EF4-FFF2-40B4-BE49-F238E27FC236}">
-                <a16:creationId xmlns:a16="http://schemas.microsoft.com/office/drawing/2014/main" id="{121F8870-B73B-27B6-5FF2-A04C8774E1AA}"/>
-              </a:ext>
-            </a:extLst>
-          </p:cNvPr>
-          <p:cNvSpPr txBox="1">
-            <a:spLocks/>
-          </p:cNvSpPr>
-          <p:nvPr/>
-        </p:nvSpPr>
-        <p:spPr>
-          <a:xfrm>
-            <a:off x="459102" y="1606493"/>
-            <a:ext cx="6791703" cy="995039"/>
-          </a:xfrm>
-          <a:prstGeom prst="rect">
-            <a:avLst/>
-          </a:prstGeom>
-        </p:spPr>
-        <p:txBody>
-          <a:bodyPr anchor="b"/>
-          <a:lstStyle>
-            <a:lvl1pPr marL="0" indent="0" algn="l" defTabSz="914400" rtl="0" eaLnBrk="1" latinLnBrk="0" hangingPunct="1">
-              <a:lnSpc>
-                <a:spcPct val="110000"/>
-              </a:lnSpc>
-              <a:spcBef>
-                <a:spcPts val="0"/>
-              </a:spcBef>
-              <a:spcAft>
-                <a:spcPts val="0"/>
-              </a:spcAft>
-              <a:buFont typeface="+mj-lt"/>
-              <a:buNone/>
-              <a:defRPr sz="2200" b="1" i="0" kern="1200">
-                <a:solidFill>
-                  <a:schemeClr val="bg1"/>
-                </a:solidFill>
-                <a:latin typeface="Arial" panose="020B0604020202020204" pitchFamily="34" charset="0"/>
-                <a:ea typeface="Inter Medium" panose="020B0502030000000004" pitchFamily="34" charset="0"/>
-                <a:cs typeface="Arial" panose="020B0604020202020204" pitchFamily="34" charset="0"/>
-              </a:defRPr>
-            </a:lvl1pPr>
-            <a:lvl2pPr marL="685800" indent="-228600" algn="l" defTabSz="914400" rtl="0" eaLnBrk="1" latinLnBrk="0" hangingPunct="1">
-              <a:lnSpc>
-                <a:spcPct val="90000"/>
-              </a:lnSpc>
-              <a:spcBef>
-                <a:spcPts val="500"/>
-              </a:spcBef>
-              <a:buFont typeface="Arial" panose="020B0604020202020204" pitchFamily="34" charset="0"/>
-              <a:buChar char="•"/>
-              <a:defRPr sz="2400" kern="1200">
-                <a:solidFill>
-                  <a:schemeClr val="tx1"/>
-                </a:solidFill>
-                <a:latin typeface="+mn-lt"/>
-                <a:ea typeface="+mn-ea"/>
-                <a:cs typeface="+mn-cs"/>
-              </a:defRPr>
-            </a:lvl2pPr>
-            <a:lvl3pPr marL="1143000" indent="-228600" algn="l" defTabSz="914400" rtl="0" eaLnBrk="1" latinLnBrk="0" hangingPunct="1">
-              <a:lnSpc>
-                <a:spcPct val="90000"/>
-              </a:lnSpc>
-              <a:spcBef>
-                <a:spcPts val="500"/>
-              </a:spcBef>
-              <a:buFont typeface="Arial" panose="020B0604020202020204" pitchFamily="34" charset="0"/>
-              <a:buChar char="•"/>
-              <a:defRPr sz="2000" kern="1200">
-                <a:solidFill>
-                  <a:schemeClr val="tx1"/>
-                </a:solidFill>
-                <a:latin typeface="+mn-lt"/>
-                <a:ea typeface="+mn-ea"/>
-                <a:cs typeface="+mn-cs"/>
-              </a:defRPr>
-            </a:lvl3pPr>
-            <a:lvl4pPr marL="1600200" indent="-228600" algn="l" defTabSz="914400" rtl="0" eaLnBrk="1" latinLnBrk="0" hangingPunct="1">
-              <a:lnSpc>
-                <a:spcPct val="90000"/>
-              </a:lnSpc>
-              <a:spcBef>
-                <a:spcPts val="500"/>
-              </a:spcBef>
-              <a:buFont typeface="Arial" panose="020B0604020202020204" pitchFamily="34" charset="0"/>
-              <a:buChar char="•"/>
-              <a:defRPr sz="1800" kern="1200">
-                <a:solidFill>
-                  <a:schemeClr val="tx1"/>
-                </a:solidFill>
-                <a:latin typeface="+mn-lt"/>
-                <a:ea typeface="+mn-ea"/>
-                <a:cs typeface="+mn-cs"/>
-              </a:defRPr>
-            </a:lvl4pPr>
-            <a:lvl5pPr marL="2057400" indent="-228600" algn="l" defTabSz="914400" rtl="0" eaLnBrk="1" latinLnBrk="0" hangingPunct="1">
-              <a:lnSpc>
-                <a:spcPct val="90000"/>
-              </a:lnSpc>
-              <a:spcBef>
-                <a:spcPts val="500"/>
-              </a:spcBef>
-              <a:buFont typeface="Arial" panose="020B0604020202020204" pitchFamily="34" charset="0"/>
-              <a:buChar char="•"/>
-              <a:defRPr sz="1800" kern="1200">
-                <a:solidFill>
-                  <a:schemeClr val="tx1"/>
-                </a:solidFill>
-                <a:latin typeface="+mn-lt"/>
-                <a:ea typeface="+mn-ea"/>
-                <a:cs typeface="+mn-cs"/>
-              </a:defRPr>
-            </a:lvl5pPr>
-            <a:lvl6pPr marL="2514600" indent="-228600" algn="l" defTabSz="914400" rtl="0" eaLnBrk="1" latinLnBrk="0" hangingPunct="1">
-              <a:lnSpc>
-                <a:spcPct val="90000"/>
-              </a:lnSpc>
-              <a:spcBef>
-                <a:spcPts val="500"/>
-              </a:spcBef>
-              <a:buFont typeface="Arial" panose="020B0604020202020204" pitchFamily="34" charset="0"/>
-              <a:buChar char="•"/>
-              <a:defRPr sz="1800" kern="1200">
-                <a:solidFill>
-                  <a:schemeClr val="tx1"/>
-                </a:solidFill>
-                <a:latin typeface="+mn-lt"/>
-                <a:ea typeface="+mn-ea"/>
-                <a:cs typeface="+mn-cs"/>
-              </a:defRPr>
-            </a:lvl6pPr>
-            <a:lvl7pPr marL="2971800" indent="-228600" algn="l" defTabSz="914400" rtl="0" eaLnBrk="1" latinLnBrk="0" hangingPunct="1">
-              <a:lnSpc>
-                <a:spcPct val="90000"/>
-              </a:lnSpc>
-              <a:spcBef>
-                <a:spcPts val="500"/>
-              </a:spcBef>
-              <a:buFont typeface="Arial" panose="020B0604020202020204" pitchFamily="34" charset="0"/>
-              <a:buChar char="•"/>
-              <a:defRPr sz="1800" kern="1200">
-                <a:solidFill>
-                  <a:schemeClr val="tx1"/>
-                </a:solidFill>
-                <a:latin typeface="+mn-lt"/>
-                <a:ea typeface="+mn-ea"/>
-                <a:cs typeface="+mn-cs"/>
-              </a:defRPr>
-            </a:lvl7pPr>
-            <a:lvl8pPr marL="3429000" indent="-228600" algn="l" defTabSz="914400" rtl="0" eaLnBrk="1" latinLnBrk="0" hangingPunct="1">
-              <a:lnSpc>
-                <a:spcPct val="90000"/>
-              </a:lnSpc>
-              <a:spcBef>
-                <a:spcPts val="500"/>
-              </a:spcBef>
-              <a:buFont typeface="Arial" panose="020B0604020202020204" pitchFamily="34" charset="0"/>
-              <a:buChar char="•"/>
-              <a:defRPr sz="1800" kern="1200">
-                <a:solidFill>
-                  <a:schemeClr val="tx1"/>
-                </a:solidFill>
-                <a:latin typeface="+mn-lt"/>
-                <a:ea typeface="+mn-ea"/>
-                <a:cs typeface="+mn-cs"/>
-              </a:defRPr>
-            </a:lvl8pPr>
-            <a:lvl9pPr marL="3886200" indent="-228600" algn="l" defTabSz="914400" rtl="0" eaLnBrk="1" latinLnBrk="0" hangingPunct="1">
-              <a:lnSpc>
-                <a:spcPct val="90000"/>
-              </a:lnSpc>
-              <a:spcBef>
-                <a:spcPts val="500"/>
-              </a:spcBef>
-              <a:buFont typeface="Arial" panose="020B0604020202020204" pitchFamily="34" charset="0"/>
-              <a:buChar char="•"/>
-              <a:defRPr sz="1800" kern="1200">
-                <a:solidFill>
-                  <a:schemeClr val="tx1"/>
-                </a:solidFill>
-                <a:latin typeface="+mn-lt"/>
-                <a:ea typeface="+mn-ea"/>
-                <a:cs typeface="+mn-cs"/>
-              </a:defRPr>
-            </a:lvl9pPr>
-          </a:lstStyle>
-          <a:p>
-            <a:pPr algn="just"/>
-            <a:r>
-              <a:rPr lang="lt-LT" sz="2000" b="0" dirty="0"/>
-              <a:t>Sumažina kokybės testuotojų komandos užimtumą ir leidžia anksčiau surasti klaidas. </a:t>
-            </a:r>
-          </a:p>
-        </p:txBody>
-      </p:sp>
-      <p:pic>
-        <p:nvPicPr>
-          <p:cNvPr id="4" name="Picture 3" descr="A picture containing text, electronics&#10;&#10;Description automatically generated">
-            <a:extLst>
-              <a:ext uri="{FF2B5EF4-FFF2-40B4-BE49-F238E27FC236}">
-                <a16:creationId xmlns:a16="http://schemas.microsoft.com/office/drawing/2014/main" id="{1F0C547F-C88A-B5BE-61A0-91C5126BB602}"/>
-              </a:ext>
-            </a:extLst>
-          </p:cNvPr>
-          <p:cNvPicPr>
-            <a:picLocks noChangeAspect="1"/>
-          </p:cNvPicPr>
-          <p:nvPr/>
-        </p:nvPicPr>
-        <p:blipFill>
-          <a:blip r:embed="rId2">
-            <a:extLst>
-              <a:ext uri="{28A0092B-C50C-407E-A947-70E740481C1C}">
-                <a14:useLocalDpi xmlns:a14="http://schemas.microsoft.com/office/drawing/2010/main" val="0"/>
-              </a:ext>
-            </a:extLst>
-          </a:blip>
-          <a:srcRect/>
-          <a:stretch>
-            <a:fillRect/>
-          </a:stretch>
-        </p:blipFill>
-        <p:spPr bwMode="auto">
-          <a:xfrm>
-            <a:off x="2918445" y="2787359"/>
-            <a:ext cx="6355110" cy="4070641"/>
-          </a:xfrm>
-          <a:prstGeom prst="rect">
-            <a:avLst/>
-          </a:prstGeom>
-          <a:noFill/>
-          <a:ln>
-            <a:noFill/>
-          </a:ln>
-        </p:spPr>
-      </p:pic>
-    </p:spTree>
-    <p:extLst>
-      <p:ext uri="{BB962C8B-B14F-4D97-AF65-F5344CB8AC3E}">
-        <p14:creationId xmlns:p14="http://schemas.microsoft.com/office/powerpoint/2010/main" val="3904678628"/>
-      </p:ext>
-    </p:extLst>
-  </p:cSld>
-  <p:clrMapOvr>
-    <a:masterClrMapping/>
-  </p:clrMapOvr>
-</p:sld>
-</file>
-
-<file path=ppt/slides/slide15.xml><?xml version="1.0" encoding="utf-8"?>
-<p:sld xmlns:a="http://schemas.openxmlformats.org/drawingml/2006/main" xmlns:r="http://schemas.openxmlformats.org/officeDocument/2006/relationships" xmlns:p="http://schemas.openxmlformats.org/presentationml/2006/main">
-  <p:cSld>
-    <p:spTree>
-      <p:nvGrpSpPr>
-        <p:cNvPr id="1" name=""/>
-        <p:cNvGrpSpPr/>
-        <p:nvPr/>
-      </p:nvGrpSpPr>
-      <p:grpSpPr>
-        <a:xfrm>
-          <a:off x="0" y="0"/>
-          <a:ext cx="0" cy="0"/>
-          <a:chOff x="0" y="0"/>
-          <a:chExt cx="0" cy="0"/>
-        </a:xfrm>
-      </p:grpSpPr>
-      <p:sp>
-        <p:nvSpPr>
-          <p:cNvPr id="2" name="Text Placeholder 1">
-            <a:extLst>
-              <a:ext uri="{FF2B5EF4-FFF2-40B4-BE49-F238E27FC236}">
-                <a16:creationId xmlns:a16="http://schemas.microsoft.com/office/drawing/2014/main" id="{4BF41ED2-32ED-3FBD-3714-A5B7C2499D70}"/>
-              </a:ext>
-            </a:extLst>
-          </p:cNvPr>
-          <p:cNvSpPr>
-            <a:spLocks noGrp="1"/>
-          </p:cNvSpPr>
-          <p:nvPr>
-            <p:ph type="body" sz="quarter" idx="11"/>
-          </p:nvPr>
-        </p:nvSpPr>
-        <p:spPr/>
-        <p:txBody>
-          <a:bodyPr/>
-          <a:lstStyle/>
-          <a:p>
-            <a:r>
-              <a:rPr lang="lt-LT" dirty="0"/>
-              <a:t>Aplikacijos struktūra </a:t>
-            </a:r>
-          </a:p>
-        </p:txBody>
-      </p:sp>
-      <p:sp>
-        <p:nvSpPr>
-          <p:cNvPr id="3" name="Text Placeholder 3">
-            <a:extLst>
-              <a:ext uri="{FF2B5EF4-FFF2-40B4-BE49-F238E27FC236}">
-                <a16:creationId xmlns:a16="http://schemas.microsoft.com/office/drawing/2014/main" id="{121F8870-B73B-27B6-5FF2-A04C8774E1AA}"/>
-              </a:ext>
-            </a:extLst>
-          </p:cNvPr>
-          <p:cNvSpPr txBox="1">
-            <a:spLocks/>
-          </p:cNvSpPr>
-          <p:nvPr/>
-        </p:nvSpPr>
-        <p:spPr>
-          <a:xfrm>
-            <a:off x="459102" y="1606493"/>
-            <a:ext cx="10603850" cy="1252617"/>
-          </a:xfrm>
-          <a:prstGeom prst="rect">
-            <a:avLst/>
-          </a:prstGeom>
-        </p:spPr>
-        <p:txBody>
-          <a:bodyPr anchor="b"/>
-          <a:lstStyle>
-            <a:lvl1pPr marL="0" indent="0" algn="l" defTabSz="914400" rtl="0" eaLnBrk="1" latinLnBrk="0" hangingPunct="1">
-              <a:lnSpc>
-                <a:spcPct val="110000"/>
-              </a:lnSpc>
-              <a:spcBef>
-                <a:spcPts val="0"/>
-              </a:spcBef>
-              <a:spcAft>
-                <a:spcPts val="0"/>
-              </a:spcAft>
-              <a:buFont typeface="+mj-lt"/>
-              <a:buNone/>
-              <a:defRPr sz="2200" b="1" i="0" kern="1200">
-                <a:solidFill>
-                  <a:schemeClr val="bg1"/>
-                </a:solidFill>
-                <a:latin typeface="Arial" panose="020B0604020202020204" pitchFamily="34" charset="0"/>
-                <a:ea typeface="Inter Medium" panose="020B0502030000000004" pitchFamily="34" charset="0"/>
-                <a:cs typeface="Arial" panose="020B0604020202020204" pitchFamily="34" charset="0"/>
-              </a:defRPr>
-            </a:lvl1pPr>
-            <a:lvl2pPr marL="685800" indent="-228600" algn="l" defTabSz="914400" rtl="0" eaLnBrk="1" latinLnBrk="0" hangingPunct="1">
-              <a:lnSpc>
-                <a:spcPct val="90000"/>
-              </a:lnSpc>
-              <a:spcBef>
-                <a:spcPts val="500"/>
-              </a:spcBef>
-              <a:buFont typeface="Arial" panose="020B0604020202020204" pitchFamily="34" charset="0"/>
-              <a:buChar char="•"/>
-              <a:defRPr sz="2400" kern="1200">
-                <a:solidFill>
-                  <a:schemeClr val="tx1"/>
-                </a:solidFill>
-                <a:latin typeface="+mn-lt"/>
-                <a:ea typeface="+mn-ea"/>
-                <a:cs typeface="+mn-cs"/>
-              </a:defRPr>
-            </a:lvl2pPr>
-            <a:lvl3pPr marL="1143000" indent="-228600" algn="l" defTabSz="914400" rtl="0" eaLnBrk="1" latinLnBrk="0" hangingPunct="1">
-              <a:lnSpc>
-                <a:spcPct val="90000"/>
-              </a:lnSpc>
-              <a:spcBef>
-                <a:spcPts val="500"/>
-              </a:spcBef>
-              <a:buFont typeface="Arial" panose="020B0604020202020204" pitchFamily="34" charset="0"/>
-              <a:buChar char="•"/>
-              <a:defRPr sz="2000" kern="1200">
-                <a:solidFill>
-                  <a:schemeClr val="tx1"/>
-                </a:solidFill>
-                <a:latin typeface="+mn-lt"/>
-                <a:ea typeface="+mn-ea"/>
-                <a:cs typeface="+mn-cs"/>
-              </a:defRPr>
-            </a:lvl3pPr>
-            <a:lvl4pPr marL="1600200" indent="-228600" algn="l" defTabSz="914400" rtl="0" eaLnBrk="1" latinLnBrk="0" hangingPunct="1">
-              <a:lnSpc>
-                <a:spcPct val="90000"/>
-              </a:lnSpc>
-              <a:spcBef>
-                <a:spcPts val="500"/>
-              </a:spcBef>
-              <a:buFont typeface="Arial" panose="020B0604020202020204" pitchFamily="34" charset="0"/>
-              <a:buChar char="•"/>
-              <a:defRPr sz="1800" kern="1200">
-                <a:solidFill>
-                  <a:schemeClr val="tx1"/>
-                </a:solidFill>
-                <a:latin typeface="+mn-lt"/>
-                <a:ea typeface="+mn-ea"/>
-                <a:cs typeface="+mn-cs"/>
-              </a:defRPr>
-            </a:lvl4pPr>
-            <a:lvl5pPr marL="2057400" indent="-228600" algn="l" defTabSz="914400" rtl="0" eaLnBrk="1" latinLnBrk="0" hangingPunct="1">
-              <a:lnSpc>
-                <a:spcPct val="90000"/>
-              </a:lnSpc>
-              <a:spcBef>
-                <a:spcPts val="500"/>
-              </a:spcBef>
-              <a:buFont typeface="Arial" panose="020B0604020202020204" pitchFamily="34" charset="0"/>
-              <a:buChar char="•"/>
-              <a:defRPr sz="1800" kern="1200">
-                <a:solidFill>
-                  <a:schemeClr val="tx1"/>
-                </a:solidFill>
-                <a:latin typeface="+mn-lt"/>
-                <a:ea typeface="+mn-ea"/>
-                <a:cs typeface="+mn-cs"/>
-              </a:defRPr>
-            </a:lvl5pPr>
-            <a:lvl6pPr marL="2514600" indent="-228600" algn="l" defTabSz="914400" rtl="0" eaLnBrk="1" latinLnBrk="0" hangingPunct="1">
-              <a:lnSpc>
-                <a:spcPct val="90000"/>
-              </a:lnSpc>
-              <a:spcBef>
-                <a:spcPts val="500"/>
-              </a:spcBef>
-              <a:buFont typeface="Arial" panose="020B0604020202020204" pitchFamily="34" charset="0"/>
-              <a:buChar char="•"/>
-              <a:defRPr sz="1800" kern="1200">
-                <a:solidFill>
-                  <a:schemeClr val="tx1"/>
-                </a:solidFill>
-                <a:latin typeface="+mn-lt"/>
-                <a:ea typeface="+mn-ea"/>
-                <a:cs typeface="+mn-cs"/>
-              </a:defRPr>
-            </a:lvl6pPr>
-            <a:lvl7pPr marL="2971800" indent="-228600" algn="l" defTabSz="914400" rtl="0" eaLnBrk="1" latinLnBrk="0" hangingPunct="1">
-              <a:lnSpc>
-                <a:spcPct val="90000"/>
-              </a:lnSpc>
-              <a:spcBef>
-                <a:spcPts val="500"/>
-              </a:spcBef>
-              <a:buFont typeface="Arial" panose="020B0604020202020204" pitchFamily="34" charset="0"/>
-              <a:buChar char="•"/>
-              <a:defRPr sz="1800" kern="1200">
-                <a:solidFill>
-                  <a:schemeClr val="tx1"/>
-                </a:solidFill>
-                <a:latin typeface="+mn-lt"/>
-                <a:ea typeface="+mn-ea"/>
-                <a:cs typeface="+mn-cs"/>
-              </a:defRPr>
-            </a:lvl7pPr>
-            <a:lvl8pPr marL="3429000" indent="-228600" algn="l" defTabSz="914400" rtl="0" eaLnBrk="1" latinLnBrk="0" hangingPunct="1">
-              <a:lnSpc>
-                <a:spcPct val="90000"/>
-              </a:lnSpc>
-              <a:spcBef>
-                <a:spcPts val="500"/>
-              </a:spcBef>
-              <a:buFont typeface="Arial" panose="020B0604020202020204" pitchFamily="34" charset="0"/>
-              <a:buChar char="•"/>
-              <a:defRPr sz="1800" kern="1200">
-                <a:solidFill>
-                  <a:schemeClr val="tx1"/>
-                </a:solidFill>
-                <a:latin typeface="+mn-lt"/>
-                <a:ea typeface="+mn-ea"/>
-                <a:cs typeface="+mn-cs"/>
-              </a:defRPr>
-            </a:lvl8pPr>
-            <a:lvl9pPr marL="3886200" indent="-228600" algn="l" defTabSz="914400" rtl="0" eaLnBrk="1" latinLnBrk="0" hangingPunct="1">
-              <a:lnSpc>
-                <a:spcPct val="90000"/>
-              </a:lnSpc>
-              <a:spcBef>
-                <a:spcPts val="500"/>
-              </a:spcBef>
-              <a:buFont typeface="Arial" panose="020B0604020202020204" pitchFamily="34" charset="0"/>
-              <a:buChar char="•"/>
-              <a:defRPr sz="1800" kern="1200">
-                <a:solidFill>
-                  <a:schemeClr val="tx1"/>
-                </a:solidFill>
-                <a:latin typeface="+mn-lt"/>
-                <a:ea typeface="+mn-ea"/>
-                <a:cs typeface="+mn-cs"/>
-              </a:defRPr>
-            </a:lvl9pPr>
-          </a:lstStyle>
-          <a:p>
-            <a:pPr marL="342900" indent="-342900" algn="just">
-              <a:buFont typeface="Arial" panose="020B0604020202020204" pitchFamily="34" charset="0"/>
-              <a:buChar char="•"/>
-            </a:pPr>
-            <a:r>
-              <a:rPr lang="lt-LT" sz="2000" b="0" dirty="0"/>
-              <a:t>Naudojami du kodo </a:t>
-            </a:r>
-            <a:r>
-              <a:rPr lang="lt-LT" sz="2000" b="0" dirty="0" err="1"/>
-              <a:t>užkrovėjai</a:t>
-            </a:r>
-            <a:r>
-              <a:rPr lang="lt-LT" sz="2000" b="0" dirty="0"/>
-              <a:t> (</a:t>
-            </a:r>
-            <a:r>
-              <a:rPr lang="lt-LT" sz="2000" b="0" dirty="0" err="1"/>
-              <a:t>bootloaders</a:t>
-            </a:r>
-            <a:r>
-              <a:rPr lang="lt-LT" sz="2000" b="0" dirty="0"/>
-              <a:t>) tikrinantys ar aplikacija yra tinkama</a:t>
-            </a:r>
-          </a:p>
-          <a:p>
-            <a:pPr marL="342900" indent="-342900" algn="just">
-              <a:buFont typeface="Arial" panose="020B0604020202020204" pitchFamily="34" charset="0"/>
-              <a:buChar char="•"/>
-            </a:pPr>
-            <a:r>
-              <a:rPr lang="lt-LT" sz="2000" b="0" dirty="0"/>
-              <a:t>Naudojamas lygiagretusis skaičiavimas</a:t>
-            </a:r>
-          </a:p>
-          <a:p>
-            <a:pPr marL="342900" indent="-342900" algn="just">
-              <a:buFont typeface="Arial" panose="020B0604020202020204" pitchFamily="34" charset="0"/>
-              <a:buChar char="•"/>
-            </a:pPr>
-            <a:r>
-              <a:rPr lang="lt-LT" sz="2000" b="0" dirty="0"/>
-              <a:t>ECC – išnaudojama CPU klaidų tikrinimo </a:t>
-            </a:r>
-            <a:r>
-              <a:rPr lang="lt-LT" sz="2000" b="0" dirty="0" err="1"/>
-              <a:t>sąvybė</a:t>
-            </a:r>
-            <a:r>
-              <a:rPr lang="lt-LT" sz="2000" b="0" dirty="0"/>
-              <a:t> </a:t>
-            </a:r>
-          </a:p>
-        </p:txBody>
-      </p:sp>
-      <p:pic>
-        <p:nvPicPr>
-          <p:cNvPr id="5" name="Picture 4" descr="Diagram&#10;&#10;Description automatically generated">
-            <a:extLst>
-              <a:ext uri="{FF2B5EF4-FFF2-40B4-BE49-F238E27FC236}">
-                <a16:creationId xmlns:a16="http://schemas.microsoft.com/office/drawing/2014/main" id="{16F48CCA-F3DE-0FAC-D765-3729DD40500E}"/>
-              </a:ext>
-            </a:extLst>
-          </p:cNvPr>
-          <p:cNvPicPr>
-            <a:picLocks noChangeAspect="1"/>
-          </p:cNvPicPr>
-          <p:nvPr/>
-        </p:nvPicPr>
-        <p:blipFill>
-          <a:blip r:embed="rId2"/>
-          <a:stretch>
-            <a:fillRect/>
-          </a:stretch>
-        </p:blipFill>
-        <p:spPr>
-          <a:xfrm>
-            <a:off x="205532" y="3258174"/>
-            <a:ext cx="1934130" cy="3599826"/>
-          </a:xfrm>
-          <a:prstGeom prst="rect">
-            <a:avLst/>
-          </a:prstGeom>
-        </p:spPr>
-      </p:pic>
-      <p:pic>
-        <p:nvPicPr>
-          <p:cNvPr id="8196" name="Picture 4" descr="Difference between Multi-tasking and Multi-threading - GeeksforGeeks">
-            <a:extLst>
-              <a:ext uri="{FF2B5EF4-FFF2-40B4-BE49-F238E27FC236}">
-                <a16:creationId xmlns:a16="http://schemas.microsoft.com/office/drawing/2014/main" id="{D22710CE-1DE9-C175-22DC-351BE1C5AC08}"/>
-              </a:ext>
-            </a:extLst>
-          </p:cNvPr>
-          <p:cNvPicPr>
-            <a:picLocks noChangeAspect="1" noChangeArrowheads="1"/>
-          </p:cNvPicPr>
-          <p:nvPr/>
-        </p:nvPicPr>
-        <p:blipFill>
-          <a:blip r:embed="rId3">
-            <a:extLst>
-              <a:ext uri="{28A0092B-C50C-407E-A947-70E740481C1C}">
-                <a14:useLocalDpi xmlns:a14="http://schemas.microsoft.com/office/drawing/2010/main" val="0"/>
-              </a:ext>
-            </a:extLst>
-          </a:blip>
-          <a:srcRect/>
-          <a:stretch>
-            <a:fillRect/>
-          </a:stretch>
-        </p:blipFill>
-        <p:spPr bwMode="auto">
-          <a:xfrm>
-            <a:off x="2381585" y="3258174"/>
-            <a:ext cx="4581525" cy="3286125"/>
-          </a:xfrm>
-          <a:prstGeom prst="rect">
-            <a:avLst/>
-          </a:prstGeom>
-          <a:noFill/>
-          <a:extLst>
-            <a:ext uri="{909E8E84-426E-40DD-AFC4-6F175D3DCCD1}">
-              <a14:hiddenFill xmlns:a14="http://schemas.microsoft.com/office/drawing/2010/main">
-                <a:solidFill>
-                  <a:srgbClr val="FFFFFF"/>
-                </a:solidFill>
-              </a14:hiddenFill>
-            </a:ext>
-          </a:extLst>
-        </p:spPr>
-      </p:pic>
-      <p:pic>
-        <p:nvPicPr>
-          <p:cNvPr id="9" name="Picture 8">
-            <a:extLst>
-              <a:ext uri="{FF2B5EF4-FFF2-40B4-BE49-F238E27FC236}">
-                <a16:creationId xmlns:a16="http://schemas.microsoft.com/office/drawing/2014/main" id="{03B70926-1731-6971-00EB-C33689D5AA38}"/>
-              </a:ext>
-            </a:extLst>
-          </p:cNvPr>
-          <p:cNvPicPr>
-            <a:picLocks noChangeAspect="1"/>
-          </p:cNvPicPr>
-          <p:nvPr/>
-        </p:nvPicPr>
-        <p:blipFill>
-          <a:blip r:embed="rId4"/>
-          <a:stretch>
-            <a:fillRect/>
-          </a:stretch>
-        </p:blipFill>
-        <p:spPr>
-          <a:xfrm>
-            <a:off x="7095227" y="3258173"/>
-            <a:ext cx="4625622" cy="2999089"/>
-          </a:xfrm>
-          <a:prstGeom prst="rect">
-            <a:avLst/>
-          </a:prstGeom>
-        </p:spPr>
-      </p:pic>
-    </p:spTree>
-    <p:extLst>
-      <p:ext uri="{BB962C8B-B14F-4D97-AF65-F5344CB8AC3E}">
-        <p14:creationId xmlns:p14="http://schemas.microsoft.com/office/powerpoint/2010/main" val="3796651893"/>
-      </p:ext>
-    </p:extLst>
-  </p:cSld>
-  <p:clrMapOvr>
-    <a:masterClrMapping/>
-  </p:clrMapOvr>
-</p:sld>
-</file>
-
-<file path=ppt/slides/slide16.xml><?xml version="1.0" encoding="utf-8"?>
-<p:sld xmlns:a="http://schemas.openxmlformats.org/drawingml/2006/main" xmlns:r="http://schemas.openxmlformats.org/officeDocument/2006/relationships" xmlns:p="http://schemas.openxmlformats.org/presentationml/2006/main">
-  <p:cSld>
-    <p:spTree>
-      <p:nvGrpSpPr>
-        <p:cNvPr id="1" name=""/>
-        <p:cNvGrpSpPr/>
-        <p:nvPr/>
-      </p:nvGrpSpPr>
-      <p:grpSpPr>
-        <a:xfrm>
-          <a:off x="0" y="0"/>
-          <a:ext cx="0" cy="0"/>
-          <a:chOff x="0" y="0"/>
-          <a:chExt cx="0" cy="0"/>
-        </a:xfrm>
-      </p:grpSpPr>
-      <p:sp>
-        <p:nvSpPr>
-          <p:cNvPr id="2" name="Text Placeholder 1">
-            <a:extLst>
-              <a:ext uri="{FF2B5EF4-FFF2-40B4-BE49-F238E27FC236}">
-                <a16:creationId xmlns:a16="http://schemas.microsoft.com/office/drawing/2014/main" id="{4BF41ED2-32ED-3FBD-3714-A5B7C2499D70}"/>
-              </a:ext>
-            </a:extLst>
-          </p:cNvPr>
-          <p:cNvSpPr>
-            <a:spLocks noGrp="1"/>
-          </p:cNvSpPr>
-          <p:nvPr>
-            <p:ph type="body" sz="quarter" idx="11"/>
-          </p:nvPr>
-        </p:nvSpPr>
-        <p:spPr/>
-        <p:txBody>
-          <a:bodyPr/>
-          <a:lstStyle/>
-          <a:p>
-            <a:r>
-              <a:rPr lang="lt-LT" dirty="0"/>
-              <a:t>Aplikacijos struktūra </a:t>
-            </a:r>
-          </a:p>
-        </p:txBody>
-      </p:sp>
-      <p:sp>
-        <p:nvSpPr>
-          <p:cNvPr id="3" name="Text Placeholder 3">
-            <a:extLst>
-              <a:ext uri="{FF2B5EF4-FFF2-40B4-BE49-F238E27FC236}">
-                <a16:creationId xmlns:a16="http://schemas.microsoft.com/office/drawing/2014/main" id="{121F8870-B73B-27B6-5FF2-A04C8774E1AA}"/>
-              </a:ext>
-            </a:extLst>
-          </p:cNvPr>
-          <p:cNvSpPr txBox="1">
-            <a:spLocks/>
-          </p:cNvSpPr>
-          <p:nvPr/>
-        </p:nvSpPr>
-        <p:spPr>
-          <a:xfrm>
-            <a:off x="459102" y="1606493"/>
-            <a:ext cx="10603850" cy="1252617"/>
-          </a:xfrm>
-          <a:prstGeom prst="rect">
-            <a:avLst/>
-          </a:prstGeom>
-        </p:spPr>
-        <p:txBody>
-          <a:bodyPr anchor="b"/>
-          <a:lstStyle>
-            <a:lvl1pPr marL="0" indent="0" algn="l" defTabSz="914400" rtl="0" eaLnBrk="1" latinLnBrk="0" hangingPunct="1">
-              <a:lnSpc>
-                <a:spcPct val="110000"/>
-              </a:lnSpc>
-              <a:spcBef>
-                <a:spcPts val="0"/>
-              </a:spcBef>
-              <a:spcAft>
-                <a:spcPts val="0"/>
-              </a:spcAft>
-              <a:buFont typeface="+mj-lt"/>
-              <a:buNone/>
-              <a:defRPr sz="2200" b="1" i="0" kern="1200">
-                <a:solidFill>
-                  <a:schemeClr val="bg1"/>
-                </a:solidFill>
-                <a:latin typeface="Arial" panose="020B0604020202020204" pitchFamily="34" charset="0"/>
-                <a:ea typeface="Inter Medium" panose="020B0502030000000004" pitchFamily="34" charset="0"/>
-                <a:cs typeface="Arial" panose="020B0604020202020204" pitchFamily="34" charset="0"/>
-              </a:defRPr>
-            </a:lvl1pPr>
-            <a:lvl2pPr marL="685800" indent="-228600" algn="l" defTabSz="914400" rtl="0" eaLnBrk="1" latinLnBrk="0" hangingPunct="1">
-              <a:lnSpc>
-                <a:spcPct val="90000"/>
-              </a:lnSpc>
-              <a:spcBef>
-                <a:spcPts val="500"/>
-              </a:spcBef>
-              <a:buFont typeface="Arial" panose="020B0604020202020204" pitchFamily="34" charset="0"/>
-              <a:buChar char="•"/>
-              <a:defRPr sz="2400" kern="1200">
-                <a:solidFill>
-                  <a:schemeClr val="tx1"/>
-                </a:solidFill>
-                <a:latin typeface="+mn-lt"/>
-                <a:ea typeface="+mn-ea"/>
-                <a:cs typeface="+mn-cs"/>
-              </a:defRPr>
-            </a:lvl2pPr>
-            <a:lvl3pPr marL="1143000" indent="-228600" algn="l" defTabSz="914400" rtl="0" eaLnBrk="1" latinLnBrk="0" hangingPunct="1">
-              <a:lnSpc>
-                <a:spcPct val="90000"/>
-              </a:lnSpc>
-              <a:spcBef>
-                <a:spcPts val="500"/>
-              </a:spcBef>
-              <a:buFont typeface="Arial" panose="020B0604020202020204" pitchFamily="34" charset="0"/>
-              <a:buChar char="•"/>
-              <a:defRPr sz="2000" kern="1200">
-                <a:solidFill>
-                  <a:schemeClr val="tx1"/>
-                </a:solidFill>
-                <a:latin typeface="+mn-lt"/>
-                <a:ea typeface="+mn-ea"/>
-                <a:cs typeface="+mn-cs"/>
-              </a:defRPr>
-            </a:lvl3pPr>
-            <a:lvl4pPr marL="1600200" indent="-228600" algn="l" defTabSz="914400" rtl="0" eaLnBrk="1" latinLnBrk="0" hangingPunct="1">
-              <a:lnSpc>
-                <a:spcPct val="90000"/>
-              </a:lnSpc>
-              <a:spcBef>
-                <a:spcPts val="500"/>
-              </a:spcBef>
-              <a:buFont typeface="Arial" panose="020B0604020202020204" pitchFamily="34" charset="0"/>
-              <a:buChar char="•"/>
-              <a:defRPr sz="1800" kern="1200">
-                <a:solidFill>
-                  <a:schemeClr val="tx1"/>
-                </a:solidFill>
-                <a:latin typeface="+mn-lt"/>
-                <a:ea typeface="+mn-ea"/>
-                <a:cs typeface="+mn-cs"/>
-              </a:defRPr>
-            </a:lvl4pPr>
-            <a:lvl5pPr marL="2057400" indent="-228600" algn="l" defTabSz="914400" rtl="0" eaLnBrk="1" latinLnBrk="0" hangingPunct="1">
-              <a:lnSpc>
-                <a:spcPct val="90000"/>
-              </a:lnSpc>
-              <a:spcBef>
-                <a:spcPts val="500"/>
-              </a:spcBef>
-              <a:buFont typeface="Arial" panose="020B0604020202020204" pitchFamily="34" charset="0"/>
-              <a:buChar char="•"/>
-              <a:defRPr sz="1800" kern="1200">
-                <a:solidFill>
-                  <a:schemeClr val="tx1"/>
-                </a:solidFill>
-                <a:latin typeface="+mn-lt"/>
-                <a:ea typeface="+mn-ea"/>
-                <a:cs typeface="+mn-cs"/>
-              </a:defRPr>
-            </a:lvl5pPr>
-            <a:lvl6pPr marL="2514600" indent="-228600" algn="l" defTabSz="914400" rtl="0" eaLnBrk="1" latinLnBrk="0" hangingPunct="1">
-              <a:lnSpc>
-                <a:spcPct val="90000"/>
-              </a:lnSpc>
-              <a:spcBef>
-                <a:spcPts val="500"/>
-              </a:spcBef>
-              <a:buFont typeface="Arial" panose="020B0604020202020204" pitchFamily="34" charset="0"/>
-              <a:buChar char="•"/>
-              <a:defRPr sz="1800" kern="1200">
-                <a:solidFill>
-                  <a:schemeClr val="tx1"/>
-                </a:solidFill>
-                <a:latin typeface="+mn-lt"/>
-                <a:ea typeface="+mn-ea"/>
-                <a:cs typeface="+mn-cs"/>
-              </a:defRPr>
-            </a:lvl6pPr>
-            <a:lvl7pPr marL="2971800" indent="-228600" algn="l" defTabSz="914400" rtl="0" eaLnBrk="1" latinLnBrk="0" hangingPunct="1">
-              <a:lnSpc>
-                <a:spcPct val="90000"/>
-              </a:lnSpc>
-              <a:spcBef>
-                <a:spcPts val="500"/>
-              </a:spcBef>
-              <a:buFont typeface="Arial" panose="020B0604020202020204" pitchFamily="34" charset="0"/>
-              <a:buChar char="•"/>
-              <a:defRPr sz="1800" kern="1200">
-                <a:solidFill>
-                  <a:schemeClr val="tx1"/>
-                </a:solidFill>
-                <a:latin typeface="+mn-lt"/>
-                <a:ea typeface="+mn-ea"/>
-                <a:cs typeface="+mn-cs"/>
-              </a:defRPr>
-            </a:lvl7pPr>
-            <a:lvl8pPr marL="3429000" indent="-228600" algn="l" defTabSz="914400" rtl="0" eaLnBrk="1" latinLnBrk="0" hangingPunct="1">
-              <a:lnSpc>
-                <a:spcPct val="90000"/>
-              </a:lnSpc>
-              <a:spcBef>
-                <a:spcPts val="500"/>
-              </a:spcBef>
-              <a:buFont typeface="Arial" panose="020B0604020202020204" pitchFamily="34" charset="0"/>
-              <a:buChar char="•"/>
-              <a:defRPr sz="1800" kern="1200">
-                <a:solidFill>
-                  <a:schemeClr val="tx1"/>
-                </a:solidFill>
-                <a:latin typeface="+mn-lt"/>
-                <a:ea typeface="+mn-ea"/>
-                <a:cs typeface="+mn-cs"/>
-              </a:defRPr>
-            </a:lvl8pPr>
-            <a:lvl9pPr marL="3886200" indent="-228600" algn="l" defTabSz="914400" rtl="0" eaLnBrk="1" latinLnBrk="0" hangingPunct="1">
-              <a:lnSpc>
-                <a:spcPct val="90000"/>
-              </a:lnSpc>
-              <a:spcBef>
-                <a:spcPts val="500"/>
-              </a:spcBef>
-              <a:buFont typeface="Arial" panose="020B0604020202020204" pitchFamily="34" charset="0"/>
-              <a:buChar char="•"/>
-              <a:defRPr sz="1800" kern="1200">
-                <a:solidFill>
-                  <a:schemeClr val="tx1"/>
-                </a:solidFill>
-                <a:latin typeface="+mn-lt"/>
-                <a:ea typeface="+mn-ea"/>
-                <a:cs typeface="+mn-cs"/>
-              </a:defRPr>
-            </a:lvl9pPr>
-          </a:lstStyle>
-          <a:p>
-            <a:pPr marL="342900" indent="-342900" algn="just">
-              <a:buFont typeface="Arial" panose="020B0604020202020204" pitchFamily="34" charset="0"/>
-              <a:buChar char="•"/>
-            </a:pPr>
-            <a:r>
-              <a:rPr lang="lt-LT" sz="2000" b="0" dirty="0"/>
-              <a:t>Naudojami WDT (tiek įprasti tiek antžeminės stoties)</a:t>
-            </a:r>
-          </a:p>
-          <a:p>
-            <a:pPr marL="342900" indent="-342900" algn="just">
-              <a:buFont typeface="Arial" panose="020B0604020202020204" pitchFamily="34" charset="0"/>
-              <a:buChar char="•"/>
-            </a:pPr>
-            <a:r>
-              <a:rPr lang="lt-LT" sz="2000" b="0" dirty="0"/>
-              <a:t>Šaltas/karštas perteklius (</a:t>
-            </a:r>
-            <a:r>
-              <a:rPr lang="lt-LT" sz="2000" b="0" dirty="0" err="1"/>
-              <a:t>cold</a:t>
-            </a:r>
-            <a:r>
-              <a:rPr lang="lt-LT" sz="2000" b="0" dirty="0"/>
-              <a:t>/</a:t>
-            </a:r>
-            <a:r>
-              <a:rPr lang="lt-LT" sz="2000" b="0" dirty="0" err="1"/>
-              <a:t>hot</a:t>
-            </a:r>
-            <a:r>
-              <a:rPr lang="lt-LT" sz="2000" b="0" dirty="0"/>
-              <a:t> </a:t>
-            </a:r>
-            <a:r>
-              <a:rPr lang="lt-LT" sz="2000" b="0" dirty="0" err="1"/>
-              <a:t>redundancy</a:t>
-            </a:r>
-            <a:r>
-              <a:rPr lang="lt-LT" sz="2000" b="0" dirty="0"/>
-              <a:t>)</a:t>
-            </a:r>
-          </a:p>
-        </p:txBody>
-      </p:sp>
-      <p:pic>
-        <p:nvPicPr>
-          <p:cNvPr id="11266" name="Picture 2" descr="Watchdog timer - Wikipedia">
-            <a:extLst>
-              <a:ext uri="{FF2B5EF4-FFF2-40B4-BE49-F238E27FC236}">
-                <a16:creationId xmlns:a16="http://schemas.microsoft.com/office/drawing/2014/main" id="{FF57CBF5-B07D-85FF-A908-26E00E2CE8AC}"/>
-              </a:ext>
-            </a:extLst>
-          </p:cNvPr>
-          <p:cNvPicPr>
-            <a:picLocks noChangeAspect="1" noChangeArrowheads="1"/>
-          </p:cNvPicPr>
-          <p:nvPr/>
-        </p:nvPicPr>
-        <p:blipFill>
-          <a:blip r:embed="rId2">
-            <a:extLst>
-              <a:ext uri="{28A0092B-C50C-407E-A947-70E740481C1C}">
-                <a14:useLocalDpi xmlns:a14="http://schemas.microsoft.com/office/drawing/2010/main" val="0"/>
-              </a:ext>
-            </a:extLst>
-          </a:blip>
-          <a:srcRect/>
-          <a:stretch>
-            <a:fillRect/>
-          </a:stretch>
-        </p:blipFill>
-        <p:spPr bwMode="auto">
-          <a:xfrm>
-            <a:off x="459102" y="3355230"/>
-            <a:ext cx="5096727" cy="3125518"/>
-          </a:xfrm>
-          <a:prstGeom prst="rect">
-            <a:avLst/>
-          </a:prstGeom>
-          <a:noFill/>
-          <a:extLst>
-            <a:ext uri="{909E8E84-426E-40DD-AFC4-6F175D3DCCD1}">
-              <a14:hiddenFill xmlns:a14="http://schemas.microsoft.com/office/drawing/2010/main">
-                <a:solidFill>
-                  <a:srgbClr val="FFFFFF"/>
-                </a:solidFill>
-              </a14:hiddenFill>
-            </a:ext>
-          </a:extLst>
-        </p:spPr>
-      </p:pic>
-      <p:pic>
-        <p:nvPicPr>
-          <p:cNvPr id="11270" name="Picture 6" descr="TECHNICAL WHITE PAPER PROBABILITY AND REDUNDANCY">
-            <a:extLst>
-              <a:ext uri="{FF2B5EF4-FFF2-40B4-BE49-F238E27FC236}">
-                <a16:creationId xmlns:a16="http://schemas.microsoft.com/office/drawing/2014/main" id="{50FAF3F5-426F-8772-B271-076B10883E79}"/>
-              </a:ext>
-            </a:extLst>
-          </p:cNvPr>
-          <p:cNvPicPr>
-            <a:picLocks noChangeAspect="1" noChangeArrowheads="1"/>
-          </p:cNvPicPr>
-          <p:nvPr/>
-        </p:nvPicPr>
-        <p:blipFill>
-          <a:blip r:embed="rId3">
-            <a:extLst>
-              <a:ext uri="{28A0092B-C50C-407E-A947-70E740481C1C}">
-                <a14:useLocalDpi xmlns:a14="http://schemas.microsoft.com/office/drawing/2010/main" val="0"/>
-              </a:ext>
-            </a:extLst>
-          </a:blip>
-          <a:srcRect/>
-          <a:stretch>
-            <a:fillRect/>
-          </a:stretch>
-        </p:blipFill>
-        <p:spPr bwMode="auto">
-          <a:xfrm>
-            <a:off x="6139300" y="3355230"/>
-            <a:ext cx="5096726" cy="3125518"/>
-          </a:xfrm>
-          <a:prstGeom prst="rect">
-            <a:avLst/>
-          </a:prstGeom>
-          <a:noFill/>
-          <a:extLst>
-            <a:ext uri="{909E8E84-426E-40DD-AFC4-6F175D3DCCD1}">
-              <a14:hiddenFill xmlns:a14="http://schemas.microsoft.com/office/drawing/2010/main">
-                <a:solidFill>
-                  <a:srgbClr val="FFFFFF"/>
-                </a:solidFill>
-              </a14:hiddenFill>
-            </a:ext>
-          </a:extLst>
-        </p:spPr>
-      </p:pic>
-    </p:spTree>
-    <p:extLst>
-      <p:ext uri="{BB962C8B-B14F-4D97-AF65-F5344CB8AC3E}">
-        <p14:creationId xmlns:p14="http://schemas.microsoft.com/office/powerpoint/2010/main" val="2137750399"/>
-      </p:ext>
-    </p:extLst>
-  </p:cSld>
-  <p:clrMapOvr>
-    <a:masterClrMapping/>
-  </p:clrMapOvr>
-</p:sld>
-</file>
-
-<file path=ppt/slides/slide17.xml><?xml version="1.0" encoding="utf-8"?>
-<p:sld xmlns:a="http://schemas.openxmlformats.org/drawingml/2006/main" xmlns:r="http://schemas.openxmlformats.org/officeDocument/2006/relationships" xmlns:p="http://schemas.openxmlformats.org/presentationml/2006/main">
-  <p:cSld>
-    <p:spTree>
-      <p:nvGrpSpPr>
-        <p:cNvPr id="1" name=""/>
-        <p:cNvGrpSpPr/>
-        <p:nvPr/>
-      </p:nvGrpSpPr>
-      <p:grpSpPr>
-        <a:xfrm>
-          <a:off x="0" y="0"/>
-          <a:ext cx="0" cy="0"/>
-          <a:chOff x="0" y="0"/>
-          <a:chExt cx="0" cy="0"/>
-        </a:xfrm>
-      </p:grpSpPr>
-      <p:sp>
-        <p:nvSpPr>
-          <p:cNvPr id="2" name="Text Placeholder 1">
-            <a:extLst>
-              <a:ext uri="{FF2B5EF4-FFF2-40B4-BE49-F238E27FC236}">
-                <a16:creationId xmlns:a16="http://schemas.microsoft.com/office/drawing/2014/main" id="{4BF41ED2-32ED-3FBD-3714-A5B7C2499D70}"/>
-              </a:ext>
-            </a:extLst>
-          </p:cNvPr>
-          <p:cNvSpPr>
-            <a:spLocks noGrp="1"/>
-          </p:cNvSpPr>
-          <p:nvPr>
-            <p:ph type="body" sz="quarter" idx="11"/>
-          </p:nvPr>
-        </p:nvSpPr>
-        <p:spPr/>
-        <p:txBody>
-          <a:bodyPr/>
-          <a:lstStyle/>
-          <a:p>
-            <a:r>
-              <a:rPr lang="lt-LT" dirty="0"/>
+              <a:rPr lang="lt-LT" dirty="0">
+                <a:solidFill>
+                  <a:srgbClr val="FF0000"/>
+                </a:solidFill>
+              </a:rPr>
               <a:t>Išvados</a:t>
             </a:r>
           </a:p>
@@ -25913,7 +23981,7 @@
 </p:sld>
 </file>
 
-<file path=ppt/slides/slide18.xml><?xml version="1.0" encoding="utf-8"?>
+<file path=ppt/slides/slide12.xml><?xml version="1.0" encoding="utf-8"?>
 <p:sld xmlns:a="http://schemas.openxmlformats.org/drawingml/2006/main" xmlns:r="http://schemas.openxmlformats.org/officeDocument/2006/relationships" xmlns:p="http://schemas.openxmlformats.org/presentationml/2006/main">
   <p:cSld>
     <p:spTree>
@@ -25952,8 +24020,8 @@
           <a:lstStyle/>
           <a:p>
             <a:r>
-              <a:rPr lang="lt-LT" dirty="0"/>
-              <a:t>Klausimai?</a:t>
+              <a:rPr lang="lt-LT" sz="6000" dirty="0"/>
+              <a:t>Ačiū už dėmesį</a:t>
             </a:r>
           </a:p>
         </p:txBody>
@@ -26018,177 +24086,6 @@
           <p:cNvPr id="2" name="Text Placeholder 1">
             <a:extLst>
               <a:ext uri="{FF2B5EF4-FFF2-40B4-BE49-F238E27FC236}">
-                <a16:creationId xmlns:a16="http://schemas.microsoft.com/office/drawing/2014/main" id="{83EF7822-1ACD-74BC-A253-B166F13F7930}"/>
-              </a:ext>
-            </a:extLst>
-          </p:cNvPr>
-          <p:cNvSpPr>
-            <a:spLocks noGrp="1"/>
-          </p:cNvSpPr>
-          <p:nvPr>
-            <p:ph type="body" sz="quarter" idx="10"/>
-          </p:nvPr>
-        </p:nvSpPr>
-        <p:spPr/>
-        <p:txBody>
-          <a:bodyPr/>
-          <a:lstStyle/>
-          <a:p>
-            <a:r>
-              <a:rPr lang="lt-LT" dirty="0"/>
-              <a:t>Įvadas</a:t>
-            </a:r>
-          </a:p>
-          <a:p>
-            <a:r>
-              <a:rPr lang="lt-LT" dirty="0"/>
-              <a:t>Kas yra kosmoso palydovai</a:t>
-            </a:r>
-          </a:p>
-          <a:p>
-            <a:r>
-              <a:rPr lang="lt-LT" dirty="0"/>
-              <a:t>Palydovų patikimumas</a:t>
-            </a:r>
-          </a:p>
-          <a:p>
-            <a:r>
-              <a:rPr lang="lt-LT" dirty="0"/>
-              <a:t>Palydovų testavimas</a:t>
-            </a:r>
-          </a:p>
-          <a:p>
-            <a:r>
-              <a:rPr lang="lt-LT" dirty="0"/>
-              <a:t>,,</a:t>
-            </a:r>
-            <a:r>
-              <a:rPr lang="lt-LT" dirty="0" err="1"/>
-              <a:t>Nanoavionics</a:t>
-            </a:r>
-            <a:r>
-              <a:rPr lang="lt-LT" dirty="0"/>
-              <a:t>“ taikomos praktikos</a:t>
-            </a:r>
-          </a:p>
-          <a:p>
-            <a:r>
-              <a:rPr lang="lt-LT" dirty="0"/>
-              <a:t>Aparatūriniai (angl. </a:t>
-            </a:r>
-            <a:r>
-              <a:rPr lang="lt-LT" dirty="0" err="1"/>
-              <a:t>hardware</a:t>
-            </a:r>
-            <a:r>
-              <a:rPr lang="lt-LT" dirty="0"/>
-              <a:t>) sprendimai </a:t>
-            </a:r>
-          </a:p>
-          <a:p>
-            <a:r>
-              <a:rPr lang="lt-LT" dirty="0"/>
-              <a:t>Programinės įrangos (angl. </a:t>
-            </a:r>
-            <a:r>
-              <a:rPr lang="lt-LT" dirty="0" err="1"/>
-              <a:t>software</a:t>
-            </a:r>
-            <a:r>
-              <a:rPr lang="lt-LT" dirty="0"/>
-              <a:t>) sprendimai</a:t>
-            </a:r>
-          </a:p>
-        </p:txBody>
-      </p:sp>
-      <p:sp>
-        <p:nvSpPr>
-          <p:cNvPr id="3" name="Text Placeholder 2">
-            <a:extLst>
-              <a:ext uri="{FF2B5EF4-FFF2-40B4-BE49-F238E27FC236}">
-                <a16:creationId xmlns:a16="http://schemas.microsoft.com/office/drawing/2014/main" id="{BF1B9E5C-2E9E-629A-439A-72938D8FEBD1}"/>
-              </a:ext>
-            </a:extLst>
-          </p:cNvPr>
-          <p:cNvSpPr>
-            <a:spLocks noGrp="1"/>
-          </p:cNvSpPr>
-          <p:nvPr>
-            <p:ph type="body" sz="quarter" idx="11"/>
-          </p:nvPr>
-        </p:nvSpPr>
-        <p:spPr/>
-        <p:txBody>
-          <a:bodyPr/>
-          <a:lstStyle/>
-          <a:p>
-            <a:r>
-              <a:rPr lang="lt-LT" dirty="0"/>
-              <a:t>Turinys</a:t>
-            </a:r>
-          </a:p>
-        </p:txBody>
-      </p:sp>
-      <p:sp>
-        <p:nvSpPr>
-          <p:cNvPr id="4" name="Text Placeholder 3">
-            <a:extLst>
-              <a:ext uri="{FF2B5EF4-FFF2-40B4-BE49-F238E27FC236}">
-                <a16:creationId xmlns:a16="http://schemas.microsoft.com/office/drawing/2014/main" id="{5C48F785-84E3-E1DA-8D42-2768498D7640}"/>
-              </a:ext>
-            </a:extLst>
-          </p:cNvPr>
-          <p:cNvSpPr>
-            <a:spLocks noGrp="1"/>
-          </p:cNvSpPr>
-          <p:nvPr>
-            <p:ph type="body" sz="quarter" idx="12"/>
-          </p:nvPr>
-        </p:nvSpPr>
-        <p:spPr/>
-        <p:txBody>
-          <a:bodyPr/>
-          <a:lstStyle/>
-          <a:p>
-            <a:endParaRPr lang="lt-LT"/>
-          </a:p>
-        </p:txBody>
-      </p:sp>
-    </p:spTree>
-    <p:extLst>
-      <p:ext uri="{BB962C8B-B14F-4D97-AF65-F5344CB8AC3E}">
-        <p14:creationId xmlns:p14="http://schemas.microsoft.com/office/powerpoint/2010/main" val="1418949371"/>
-      </p:ext>
-    </p:extLst>
-  </p:cSld>
-  <p:clrMapOvr>
-    <a:masterClrMapping/>
-  </p:clrMapOvr>
-</p:sld>
-</file>
-
-<file path=ppt/slides/slide3.xml><?xml version="1.0" encoding="utf-8"?>
-<p:sld xmlns:a="http://schemas.openxmlformats.org/drawingml/2006/main" xmlns:r="http://schemas.openxmlformats.org/officeDocument/2006/relationships" xmlns:p="http://schemas.openxmlformats.org/presentationml/2006/main">
-  <p:cSld>
-    <p:spTree>
-      <p:nvGrpSpPr>
-        <p:cNvPr id="1" name=""/>
-        <p:cNvGrpSpPr/>
-        <p:nvPr/>
-      </p:nvGrpSpPr>
-      <p:grpSpPr>
-        <a:xfrm>
-          <a:off x="0" y="0"/>
-          <a:ext cx="0" cy="0"/>
-          <a:chOff x="0" y="0"/>
-          <a:chExt cx="0" cy="0"/>
-        </a:xfrm>
-      </p:grpSpPr>
-      <p:sp>
-        <p:nvSpPr>
-          <p:cNvPr id="2" name="Text Placeholder 1">
-            <a:extLst>
-              <a:ext uri="{FF2B5EF4-FFF2-40B4-BE49-F238E27FC236}">
                 <a16:creationId xmlns:a16="http://schemas.microsoft.com/office/drawing/2014/main" id="{A05F7608-D836-9C3F-CB46-EF4B9E14CFC2}"/>
               </a:ext>
             </a:extLst>
@@ -26247,15 +24144,7 @@
             </a:pPr>
             <a:r>
               <a:rPr lang="lt-LT" b="0" dirty="0"/>
-              <a:t>Ganėtinai </a:t>
-            </a:r>
-            <a:r>
-              <a:rPr lang="lt-LT" dirty="0"/>
-              <a:t>didelė paleidimo kaina </a:t>
-            </a:r>
-            <a:r>
-              <a:rPr lang="lt-LT" b="0" dirty="0"/>
-              <a:t>turi įtakos palydovo dizainui. Stengiamasi kuo labiau sumažinti klaidos tikimybę.</a:t>
+              <a:t>Magnetins laukas kinta</a:t>
             </a:r>
           </a:p>
           <a:p>
@@ -26265,15 +24154,7 @@
             </a:pPr>
             <a:r>
               <a:rPr lang="lt-LT" b="0" dirty="0"/>
-              <a:t>Misijos (ypač mokslinės) paprastai </a:t>
-            </a:r>
-            <a:r>
-              <a:rPr lang="lt-LT" dirty="0"/>
-              <a:t>būna unikalios be jokios atsarginės ar alternatyvios </a:t>
-            </a:r>
-            <a:r>
-              <a:rPr lang="lt-LT" b="0" dirty="0"/>
-              <a:t>tai pačiai misijai atlikti, nesėkmės atveju. </a:t>
+              <a:t>Tai unikali matavimo sistema palyfovuose</a:t>
             </a:r>
           </a:p>
           <a:p>
@@ -26283,19 +24164,8 @@
             </a:pPr>
             <a:r>
               <a:rPr lang="lt-LT" b="0" dirty="0"/>
-              <a:t>Palydovo sistema ir elektronika yra detaliai analizuojamos siekiant užtikrinti, kad bet kurios konkrečios sudedamosios </a:t>
-            </a:r>
-            <a:r>
-              <a:rPr lang="lt-LT" dirty="0"/>
-              <a:t>dalies gedimas nekels pavojaus visos misijos</a:t>
-            </a:r>
-            <a:r>
-              <a:rPr lang="lt-LT" b="0" dirty="0"/>
-              <a:t> ilgaamžiškumui.</a:t>
-            </a:r>
-          </a:p>
-          <a:p>
-            <a:endParaRPr lang="lt-LT" b="0" dirty="0"/>
+              <a:t>zzzzz</a:t>
+            </a:r>
           </a:p>
         </p:txBody>
       </p:sp>
@@ -26303,6 +24173,225 @@
     <p:extLst>
       <p:ext uri="{BB962C8B-B14F-4D97-AF65-F5344CB8AC3E}">
         <p14:creationId xmlns:p14="http://schemas.microsoft.com/office/powerpoint/2010/main" val="3527631501"/>
+      </p:ext>
+    </p:extLst>
+  </p:cSld>
+  <p:clrMapOvr>
+    <a:masterClrMapping/>
+  </p:clrMapOvr>
+</p:sld>
+</file>
+
+<file path=ppt/slides/slide3.xml><?xml version="1.0" encoding="utf-8"?>
+<p:sld xmlns:a="http://schemas.openxmlformats.org/drawingml/2006/main" xmlns:r="http://schemas.openxmlformats.org/officeDocument/2006/relationships" xmlns:p="http://schemas.openxmlformats.org/presentationml/2006/main">
+  <p:cSld>
+    <p:spTree>
+      <p:nvGrpSpPr>
+        <p:cNvPr id="1" name=""/>
+        <p:cNvGrpSpPr/>
+        <p:nvPr/>
+      </p:nvGrpSpPr>
+      <p:grpSpPr>
+        <a:xfrm>
+          <a:off x="0" y="0"/>
+          <a:ext cx="0" cy="0"/>
+          <a:chOff x="0" y="0"/>
+          <a:chExt cx="0" cy="0"/>
+        </a:xfrm>
+      </p:grpSpPr>
+      <p:sp>
+        <p:nvSpPr>
+          <p:cNvPr id="2" name="Text Placeholder 1">
+            <a:extLst>
+              <a:ext uri="{FF2B5EF4-FFF2-40B4-BE49-F238E27FC236}">
+                <a16:creationId xmlns:a16="http://schemas.microsoft.com/office/drawing/2014/main" id="{83EF7822-1ACD-74BC-A253-B166F13F7930}"/>
+              </a:ext>
+            </a:extLst>
+          </p:cNvPr>
+          <p:cNvSpPr>
+            <a:spLocks noGrp="1"/>
+          </p:cNvSpPr>
+          <p:nvPr>
+            <p:ph type="body" sz="quarter" idx="10"/>
+          </p:nvPr>
+        </p:nvSpPr>
+        <p:spPr/>
+        <p:txBody>
+          <a:bodyPr/>
+          <a:lstStyle/>
+          <a:p>
+            <a:r>
+              <a:rPr lang="lt-LT" dirty="0">
+                <a:solidFill>
+                  <a:srgbClr val="FF0000"/>
+                </a:solidFill>
+              </a:rPr>
+              <a:t>Įvadas</a:t>
+            </a:r>
+          </a:p>
+          <a:p>
+            <a:r>
+              <a:rPr lang="lt-LT" dirty="0">
+                <a:solidFill>
+                  <a:srgbClr val="FF0000"/>
+                </a:solidFill>
+              </a:rPr>
+              <a:t>Kas yra kosmoso palydovai</a:t>
+            </a:r>
+          </a:p>
+          <a:p>
+            <a:r>
+              <a:rPr lang="lt-LT" dirty="0">
+                <a:solidFill>
+                  <a:srgbClr val="FF0000"/>
+                </a:solidFill>
+              </a:rPr>
+              <a:t>Palydovų patikimumas</a:t>
+            </a:r>
+          </a:p>
+          <a:p>
+            <a:r>
+              <a:rPr lang="lt-LT" dirty="0">
+                <a:solidFill>
+                  <a:srgbClr val="FF0000"/>
+                </a:solidFill>
+              </a:rPr>
+              <a:t>Palydovų testavimas</a:t>
+            </a:r>
+          </a:p>
+          <a:p>
+            <a:r>
+              <a:rPr lang="lt-LT" dirty="0">
+                <a:solidFill>
+                  <a:srgbClr val="FF0000"/>
+                </a:solidFill>
+              </a:rPr>
+              <a:t>,,</a:t>
+            </a:r>
+            <a:r>
+              <a:rPr lang="lt-LT" dirty="0" err="1">
+                <a:solidFill>
+                  <a:srgbClr val="FF0000"/>
+                </a:solidFill>
+              </a:rPr>
+              <a:t>Nanoavionics</a:t>
+            </a:r>
+            <a:r>
+              <a:rPr lang="lt-LT" dirty="0">
+                <a:solidFill>
+                  <a:srgbClr val="FF0000"/>
+                </a:solidFill>
+              </a:rPr>
+              <a:t>“ taikomos praktikos</a:t>
+            </a:r>
+          </a:p>
+          <a:p>
+            <a:r>
+              <a:rPr lang="lt-LT" dirty="0">
+                <a:solidFill>
+                  <a:srgbClr val="FF0000"/>
+                </a:solidFill>
+              </a:rPr>
+              <a:t>Aparatūriniai (angl. </a:t>
+            </a:r>
+            <a:r>
+              <a:rPr lang="lt-LT" dirty="0" err="1">
+                <a:solidFill>
+                  <a:srgbClr val="FF0000"/>
+                </a:solidFill>
+              </a:rPr>
+              <a:t>hardware</a:t>
+            </a:r>
+            <a:r>
+              <a:rPr lang="lt-LT" dirty="0">
+                <a:solidFill>
+                  <a:srgbClr val="FF0000"/>
+                </a:solidFill>
+              </a:rPr>
+              <a:t>) sprendimai </a:t>
+            </a:r>
+          </a:p>
+          <a:p>
+            <a:r>
+              <a:rPr lang="lt-LT" dirty="0">
+                <a:solidFill>
+                  <a:srgbClr val="FF0000"/>
+                </a:solidFill>
+              </a:rPr>
+              <a:t>Programinės įrangos (angl. </a:t>
+            </a:r>
+            <a:r>
+              <a:rPr lang="lt-LT" dirty="0" err="1">
+                <a:solidFill>
+                  <a:srgbClr val="FF0000"/>
+                </a:solidFill>
+              </a:rPr>
+              <a:t>software</a:t>
+            </a:r>
+            <a:r>
+              <a:rPr lang="lt-LT" dirty="0"/>
+              <a:t>) sprendimai</a:t>
+            </a:r>
+          </a:p>
+        </p:txBody>
+      </p:sp>
+      <p:sp>
+        <p:nvSpPr>
+          <p:cNvPr id="3" name="Text Placeholder 2">
+            <a:extLst>
+              <a:ext uri="{FF2B5EF4-FFF2-40B4-BE49-F238E27FC236}">
+                <a16:creationId xmlns:a16="http://schemas.microsoft.com/office/drawing/2014/main" id="{BF1B9E5C-2E9E-629A-439A-72938D8FEBD1}"/>
+              </a:ext>
+            </a:extLst>
+          </p:cNvPr>
+          <p:cNvSpPr>
+            <a:spLocks noGrp="1"/>
+          </p:cNvSpPr>
+          <p:nvPr>
+            <p:ph type="body" sz="quarter" idx="11"/>
+          </p:nvPr>
+        </p:nvSpPr>
+        <p:spPr/>
+        <p:txBody>
+          <a:bodyPr/>
+          <a:lstStyle/>
+          <a:p>
+            <a:r>
+              <a:rPr lang="lt-LT" dirty="0"/>
+              <a:t>Turinys</a:t>
+            </a:r>
+          </a:p>
+        </p:txBody>
+      </p:sp>
+      <p:sp>
+        <p:nvSpPr>
+          <p:cNvPr id="4" name="Text Placeholder 3">
+            <a:extLst>
+              <a:ext uri="{FF2B5EF4-FFF2-40B4-BE49-F238E27FC236}">
+                <a16:creationId xmlns:a16="http://schemas.microsoft.com/office/drawing/2014/main" id="{5C48F785-84E3-E1DA-8D42-2768498D7640}"/>
+              </a:ext>
+            </a:extLst>
+          </p:cNvPr>
+          <p:cNvSpPr>
+            <a:spLocks noGrp="1"/>
+          </p:cNvSpPr>
+          <p:nvPr>
+            <p:ph type="body" sz="quarter" idx="12"/>
+          </p:nvPr>
+        </p:nvSpPr>
+        <p:spPr/>
+        <p:txBody>
+          <a:bodyPr/>
+          <a:lstStyle/>
+          <a:p>
+            <a:endParaRPr lang="lt-LT"/>
+          </a:p>
+        </p:txBody>
+      </p:sp>
+    </p:spTree>
+    <p:extLst>
+      <p:ext uri="{BB962C8B-B14F-4D97-AF65-F5344CB8AC3E}">
+        <p14:creationId xmlns:p14="http://schemas.microsoft.com/office/powerpoint/2010/main" val="1418949371"/>
       </p:ext>
     </p:extLst>
   </p:cSld>
@@ -26424,7 +24513,7 @@
         <p:spPr>
           <a:xfrm>
             <a:off x="132430" y="1753643"/>
-            <a:ext cx="6236839" cy="2843581"/>
+            <a:ext cx="6236839" cy="3040299"/>
           </a:xfrm>
         </p:spPr>
         <p:txBody>
@@ -26436,7 +24525,7 @@
               <a:buChar char="•"/>
             </a:pPr>
             <a:r>
-              <a:rPr lang="lt-LT" dirty="0"/>
+              <a:rPr lang="lt-LT" sz="2800" dirty="0"/>
               <a:t>Žemės stebėjimas</a:t>
             </a:r>
           </a:p>
@@ -26446,7 +24535,7 @@
               <a:buChar char="•"/>
             </a:pPr>
             <a:r>
-              <a:rPr lang="lt-LT" dirty="0"/>
+              <a:rPr lang="lt-LT" sz="2800" dirty="0"/>
               <a:t>Duomenų perdavimas</a:t>
             </a:r>
           </a:p>
@@ -26456,7 +24545,7 @@
               <a:buChar char="•"/>
             </a:pPr>
             <a:r>
-              <a:rPr lang="lt-LT" dirty="0"/>
+              <a:rPr lang="lt-LT" sz="2800" dirty="0"/>
               <a:t>Naujų technologijų testavimas /  mokslinio pobūdžio</a:t>
             </a:r>
           </a:p>
@@ -26540,6 +24629,53 @@
           <a:chExt cx="0" cy="0"/>
         </a:xfrm>
       </p:grpSpPr>
+      <p:pic>
+        <p:nvPicPr>
+          <p:cNvPr id="5126" name="Picture 6" descr="Falcon 9 Takes Left Turn at Equator for NASA | CosmoQuest">
+            <a:extLst>
+              <a:ext uri="{FF2B5EF4-FFF2-40B4-BE49-F238E27FC236}">
+                <a16:creationId xmlns:a16="http://schemas.microsoft.com/office/drawing/2014/main" id="{B13EAD72-471E-E137-D5B8-D1988851D348}"/>
+              </a:ext>
+            </a:extLst>
+          </p:cNvPr>
+          <p:cNvPicPr>
+            <a:picLocks noChangeAspect="1" noChangeArrowheads="1"/>
+          </p:cNvPicPr>
+          <p:nvPr/>
+        </p:nvPicPr>
+        <p:blipFill>
+          <a:blip r:embed="rId2">
+            <a:extLst>
+              <a:ext uri="{28A0092B-C50C-407E-A947-70E740481C1C}">
+                <a14:useLocalDpi xmlns:a14="http://schemas.microsoft.com/office/drawing/2010/main" val="0"/>
+              </a:ext>
+            </a:extLst>
+          </a:blip>
+          <a:srcRect/>
+          <a:stretch>
+            <a:fillRect/>
+          </a:stretch>
+        </p:blipFill>
+        <p:spPr bwMode="auto">
+          <a:xfrm>
+            <a:off x="5324341" y="2279561"/>
+            <a:ext cx="6867659" cy="4578439"/>
+          </a:xfrm>
+          <a:prstGeom prst="rect">
+            <a:avLst/>
+          </a:prstGeom>
+          <a:noFill/>
+          <a:extLst>
+            <a:ext uri="{909E8E84-426E-40DD-AFC4-6F175D3DCCD1}">
+              <a14:hiddenFill xmlns:a14="http://schemas.microsoft.com/office/drawing/2010/main">
+                <a:solidFill>
+                  <a:srgbClr val="FFFFFF"/>
+                </a:solidFill>
+              </a14:hiddenFill>
+            </a:ext>
+          </a:extLst>
+        </p:spPr>
+      </p:pic>
       <p:sp>
         <p:nvSpPr>
           <p:cNvPr id="2" name="Text Placeholder 1">
@@ -26563,17 +24699,17 @@
           <a:p>
             <a:r>
               <a:rPr lang="lt-LT" dirty="0"/>
-              <a:t>Palydovų patikimumas</a:t>
+              <a:t>ESA</a:t>
             </a:r>
           </a:p>
         </p:txBody>
       </p:sp>
       <p:sp>
         <p:nvSpPr>
-          <p:cNvPr id="7" name="Text Placeholder 3">
+          <p:cNvPr id="3" name="Text Placeholder 3">
             <a:extLst>
               <a:ext uri="{FF2B5EF4-FFF2-40B4-BE49-F238E27FC236}">
-                <a16:creationId xmlns:a16="http://schemas.microsoft.com/office/drawing/2014/main" id="{FAF6650C-1956-F148-6B0E-18F2A2AD4312}"/>
+                <a16:creationId xmlns:a16="http://schemas.microsoft.com/office/drawing/2014/main" id="{121F8870-B73B-27B6-5FF2-A04C8774E1AA}"/>
               </a:ext>
             </a:extLst>
           </p:cNvPr>
@@ -26584,8 +24720,8 @@
         </p:nvSpPr>
         <p:spPr>
           <a:xfrm>
-            <a:off x="405247" y="1841325"/>
-            <a:ext cx="4166754" cy="4211745"/>
+            <a:off x="456339" y="1641764"/>
+            <a:ext cx="8978606" cy="1012659"/>
           </a:xfrm>
           <a:prstGeom prst="rect">
             <a:avLst/>
@@ -26766,22 +24902,209 @@
               <a:buChar char="•"/>
             </a:pPr>
             <a:r>
-              <a:rPr lang="en-US" dirty="0"/>
-              <a:t>D</a:t>
-            </a:r>
-            <a:r>
-              <a:rPr lang="lt-LT" dirty="0" err="1"/>
-              <a:t>uomenis</a:t>
-            </a:r>
-            <a:r>
               <a:rPr lang="lt-LT" dirty="0"/>
-              <a:t> apie Žemę skriejančių palydovų, paleistų nuo 1990 m.  iki 2008 m., gedimų ir statistinio patikimumo analizė</a:t>
-            </a:r>
-            <a:r>
-              <a:rPr lang="en-US" dirty="0"/>
-              <a:t>.</a:t>
-            </a:r>
-            <a:endParaRPr lang="lt-LT" dirty="0"/>
+              <a:t>Kas yra ir kokios pagrindinės veiklos sritys</a:t>
+            </a:r>
+          </a:p>
+        </p:txBody>
+      </p:sp>
+      <p:sp>
+        <p:nvSpPr>
+          <p:cNvPr id="6" name="Text Placeholder 3">
+            <a:extLst>
+              <a:ext uri="{FF2B5EF4-FFF2-40B4-BE49-F238E27FC236}">
+                <a16:creationId xmlns:a16="http://schemas.microsoft.com/office/drawing/2014/main" id="{A4ADE6AA-E2DA-99A0-DE14-EBD535625A50}"/>
+              </a:ext>
+            </a:extLst>
+          </p:cNvPr>
+          <p:cNvSpPr txBox="1">
+            <a:spLocks/>
+          </p:cNvSpPr>
+          <p:nvPr/>
+        </p:nvSpPr>
+        <p:spPr>
+          <a:xfrm>
+            <a:off x="456339" y="3335482"/>
+            <a:ext cx="4868002" cy="2730467"/>
+          </a:xfrm>
+          <a:prstGeom prst="rect">
+            <a:avLst/>
+          </a:prstGeom>
+        </p:spPr>
+        <p:txBody>
+          <a:bodyPr anchor="b"/>
+          <a:lstStyle>
+            <a:lvl1pPr marL="0" indent="0" algn="l" defTabSz="914400" rtl="0" eaLnBrk="1" latinLnBrk="0" hangingPunct="1">
+              <a:lnSpc>
+                <a:spcPct val="110000"/>
+              </a:lnSpc>
+              <a:spcBef>
+                <a:spcPts val="0"/>
+              </a:spcBef>
+              <a:spcAft>
+                <a:spcPts val="0"/>
+              </a:spcAft>
+              <a:buFont typeface="+mj-lt"/>
+              <a:buNone/>
+              <a:defRPr sz="2200" b="1" i="0" kern="1200">
+                <a:solidFill>
+                  <a:schemeClr val="bg1"/>
+                </a:solidFill>
+                <a:latin typeface="Arial" panose="020B0604020202020204" pitchFamily="34" charset="0"/>
+                <a:ea typeface="Inter Medium" panose="020B0502030000000004" pitchFamily="34" charset="0"/>
+                <a:cs typeface="Arial" panose="020B0604020202020204" pitchFamily="34" charset="0"/>
+              </a:defRPr>
+            </a:lvl1pPr>
+            <a:lvl2pPr marL="685800" indent="-228600" algn="l" defTabSz="914400" rtl="0" eaLnBrk="1" latinLnBrk="0" hangingPunct="1">
+              <a:lnSpc>
+                <a:spcPct val="90000"/>
+              </a:lnSpc>
+              <a:spcBef>
+                <a:spcPts val="500"/>
+              </a:spcBef>
+              <a:buFont typeface="Arial" panose="020B0604020202020204" pitchFamily="34" charset="0"/>
+              <a:buChar char="•"/>
+              <a:defRPr sz="2400" kern="1200">
+                <a:solidFill>
+                  <a:schemeClr val="tx1"/>
+                </a:solidFill>
+                <a:latin typeface="+mn-lt"/>
+                <a:ea typeface="+mn-ea"/>
+                <a:cs typeface="+mn-cs"/>
+              </a:defRPr>
+            </a:lvl2pPr>
+            <a:lvl3pPr marL="1143000" indent="-228600" algn="l" defTabSz="914400" rtl="0" eaLnBrk="1" latinLnBrk="0" hangingPunct="1">
+              <a:lnSpc>
+                <a:spcPct val="90000"/>
+              </a:lnSpc>
+              <a:spcBef>
+                <a:spcPts val="500"/>
+              </a:spcBef>
+              <a:buFont typeface="Arial" panose="020B0604020202020204" pitchFamily="34" charset="0"/>
+              <a:buChar char="•"/>
+              <a:defRPr sz="2000" kern="1200">
+                <a:solidFill>
+                  <a:schemeClr val="tx1"/>
+                </a:solidFill>
+                <a:latin typeface="+mn-lt"/>
+                <a:ea typeface="+mn-ea"/>
+                <a:cs typeface="+mn-cs"/>
+              </a:defRPr>
+            </a:lvl3pPr>
+            <a:lvl4pPr marL="1600200" indent="-228600" algn="l" defTabSz="914400" rtl="0" eaLnBrk="1" latinLnBrk="0" hangingPunct="1">
+              <a:lnSpc>
+                <a:spcPct val="90000"/>
+              </a:lnSpc>
+              <a:spcBef>
+                <a:spcPts val="500"/>
+              </a:spcBef>
+              <a:buFont typeface="Arial" panose="020B0604020202020204" pitchFamily="34" charset="0"/>
+              <a:buChar char="•"/>
+              <a:defRPr sz="1800" kern="1200">
+                <a:solidFill>
+                  <a:schemeClr val="tx1"/>
+                </a:solidFill>
+                <a:latin typeface="+mn-lt"/>
+                <a:ea typeface="+mn-ea"/>
+                <a:cs typeface="+mn-cs"/>
+              </a:defRPr>
+            </a:lvl4pPr>
+            <a:lvl5pPr marL="2057400" indent="-228600" algn="l" defTabSz="914400" rtl="0" eaLnBrk="1" latinLnBrk="0" hangingPunct="1">
+              <a:lnSpc>
+                <a:spcPct val="90000"/>
+              </a:lnSpc>
+              <a:spcBef>
+                <a:spcPts val="500"/>
+              </a:spcBef>
+              <a:buFont typeface="Arial" panose="020B0604020202020204" pitchFamily="34" charset="0"/>
+              <a:buChar char="•"/>
+              <a:defRPr sz="1800" kern="1200">
+                <a:solidFill>
+                  <a:schemeClr val="tx1"/>
+                </a:solidFill>
+                <a:latin typeface="+mn-lt"/>
+                <a:ea typeface="+mn-ea"/>
+                <a:cs typeface="+mn-cs"/>
+              </a:defRPr>
+            </a:lvl5pPr>
+            <a:lvl6pPr marL="2514600" indent="-228600" algn="l" defTabSz="914400" rtl="0" eaLnBrk="1" latinLnBrk="0" hangingPunct="1">
+              <a:lnSpc>
+                <a:spcPct val="90000"/>
+              </a:lnSpc>
+              <a:spcBef>
+                <a:spcPts val="500"/>
+              </a:spcBef>
+              <a:buFont typeface="Arial" panose="020B0604020202020204" pitchFamily="34" charset="0"/>
+              <a:buChar char="•"/>
+              <a:defRPr sz="1800" kern="1200">
+                <a:solidFill>
+                  <a:schemeClr val="tx1"/>
+                </a:solidFill>
+                <a:latin typeface="+mn-lt"/>
+                <a:ea typeface="+mn-ea"/>
+                <a:cs typeface="+mn-cs"/>
+              </a:defRPr>
+            </a:lvl6pPr>
+            <a:lvl7pPr marL="2971800" indent="-228600" algn="l" defTabSz="914400" rtl="0" eaLnBrk="1" latinLnBrk="0" hangingPunct="1">
+              <a:lnSpc>
+                <a:spcPct val="90000"/>
+              </a:lnSpc>
+              <a:spcBef>
+                <a:spcPts val="500"/>
+              </a:spcBef>
+              <a:buFont typeface="Arial" panose="020B0604020202020204" pitchFamily="34" charset="0"/>
+              <a:buChar char="•"/>
+              <a:defRPr sz="1800" kern="1200">
+                <a:solidFill>
+                  <a:schemeClr val="tx1"/>
+                </a:solidFill>
+                <a:latin typeface="+mn-lt"/>
+                <a:ea typeface="+mn-ea"/>
+                <a:cs typeface="+mn-cs"/>
+              </a:defRPr>
+            </a:lvl7pPr>
+            <a:lvl8pPr marL="3429000" indent="-228600" algn="l" defTabSz="914400" rtl="0" eaLnBrk="1" latinLnBrk="0" hangingPunct="1">
+              <a:lnSpc>
+                <a:spcPct val="90000"/>
+              </a:lnSpc>
+              <a:spcBef>
+                <a:spcPts val="500"/>
+              </a:spcBef>
+              <a:buFont typeface="Arial" panose="020B0604020202020204" pitchFamily="34" charset="0"/>
+              <a:buChar char="•"/>
+              <a:defRPr sz="1800" kern="1200">
+                <a:solidFill>
+                  <a:schemeClr val="tx1"/>
+                </a:solidFill>
+                <a:latin typeface="+mn-lt"/>
+                <a:ea typeface="+mn-ea"/>
+                <a:cs typeface="+mn-cs"/>
+              </a:defRPr>
+            </a:lvl8pPr>
+            <a:lvl9pPr marL="3886200" indent="-228600" algn="l" defTabSz="914400" rtl="0" eaLnBrk="1" latinLnBrk="0" hangingPunct="1">
+              <a:lnSpc>
+                <a:spcPct val="90000"/>
+              </a:lnSpc>
+              <a:spcBef>
+                <a:spcPts val="500"/>
+              </a:spcBef>
+              <a:buFont typeface="Arial" panose="020B0604020202020204" pitchFamily="34" charset="0"/>
+              <a:buChar char="•"/>
+              <a:defRPr sz="1800" kern="1200">
+                <a:solidFill>
+                  <a:schemeClr val="tx1"/>
+                </a:solidFill>
+                <a:latin typeface="+mn-lt"/>
+                <a:ea typeface="+mn-ea"/>
+                <a:cs typeface="+mn-cs"/>
+              </a:defRPr>
+            </a:lvl9pPr>
+          </a:lstStyle>
+          <a:p>
+            <a:r>
+              <a:rPr lang="lt-LT" b="0" dirty="0"/>
+              <a:t>Žymiausios misjos:</a:t>
+            </a:r>
           </a:p>
           <a:p>
             <a:pPr marL="342900" indent="-342900">
@@ -26789,8 +25112,113 @@
               <a:buChar char="•"/>
             </a:pPr>
             <a:r>
-              <a:rPr lang="lt-LT" dirty="0"/>
-              <a:t>Palydovų patikimumas yra sąlyginai aukštas.</a:t>
+              <a:rPr lang="lt-LT" b="0" dirty="0">
+                <a:solidFill>
+                  <a:srgbClr val="FF0000"/>
+                </a:solidFill>
+              </a:rPr>
+              <a:t>Vibracijų</a:t>
+            </a:r>
+          </a:p>
+          <a:p>
+            <a:pPr marL="342900" indent="-342900">
+              <a:buFont typeface="Arial" panose="020B0604020202020204" pitchFamily="34" charset="0"/>
+              <a:buChar char="•"/>
+            </a:pPr>
+            <a:r>
+              <a:rPr lang="lt-LT" b="0" dirty="0">
+                <a:solidFill>
+                  <a:srgbClr val="FF0000"/>
+                </a:solidFill>
+              </a:rPr>
+              <a:t>Radiacijos</a:t>
+            </a:r>
+          </a:p>
+          <a:p>
+            <a:pPr marL="342900" indent="-342900">
+              <a:buFont typeface="Arial" panose="020B0604020202020204" pitchFamily="34" charset="0"/>
+              <a:buChar char="•"/>
+            </a:pPr>
+            <a:r>
+              <a:rPr lang="lt-LT" b="0" dirty="0">
+                <a:solidFill>
+                  <a:srgbClr val="FF0000"/>
+                </a:solidFill>
+              </a:rPr>
+              <a:t>Šiluminio vakuumo</a:t>
+            </a:r>
+          </a:p>
+          <a:p>
+            <a:pPr marL="342900" indent="-342900">
+              <a:buFont typeface="Arial" panose="020B0604020202020204" pitchFamily="34" charset="0"/>
+              <a:buChar char="•"/>
+            </a:pPr>
+            <a:r>
+              <a:rPr lang="lt-LT" b="0" dirty="0">
+                <a:solidFill>
+                  <a:srgbClr val="FF0000"/>
+                </a:solidFill>
+              </a:rPr>
+              <a:t>Modeliavimas/simuliacijos (HIL)</a:t>
+            </a:r>
+          </a:p>
+          <a:p>
+            <a:pPr marL="342900" indent="-342900">
+              <a:buFont typeface="Arial" panose="020B0604020202020204" pitchFamily="34" charset="0"/>
+              <a:buChar char="•"/>
+            </a:pPr>
+            <a:r>
+              <a:rPr lang="lt-LT" sz="1600" b="0" i="1" dirty="0">
+                <a:solidFill>
+                  <a:srgbClr val="FF0000"/>
+                </a:solidFill>
+              </a:rPr>
+              <a:t>Standartiniai elektronikos (elektromagnetinio suderinamumo ir komunikacijos antenos testai</a:t>
+            </a:r>
+            <a:r>
+              <a:rPr lang="lt-LT" sz="1600" b="0" i="1" dirty="0"/>
+              <a:t>) </a:t>
+            </a:r>
+          </a:p>
+        </p:txBody>
+      </p:sp>
+      <p:sp>
+        <p:nvSpPr>
+          <p:cNvPr id="7" name="TextBox 6">
+            <a:extLst>
+              <a:ext uri="{FF2B5EF4-FFF2-40B4-BE49-F238E27FC236}">
+                <a16:creationId xmlns:a16="http://schemas.microsoft.com/office/drawing/2014/main" id="{2D4BBA8F-A360-2C4F-2C1E-6E9FEB6C8E5E}"/>
+              </a:ext>
+            </a:extLst>
+          </p:cNvPr>
+          <p:cNvSpPr txBox="1"/>
+          <p:nvPr/>
+        </p:nvSpPr>
+        <p:spPr>
+          <a:xfrm>
+            <a:off x="11477297" y="6299901"/>
+            <a:ext cx="304549" cy="430887"/>
+          </a:xfrm>
+          <a:prstGeom prst="rect">
+            <a:avLst/>
+          </a:prstGeom>
+          <a:noFill/>
+        </p:spPr>
+        <p:txBody>
+          <a:bodyPr wrap="square" rtlCol="0">
+            <a:spAutoFit/>
+          </a:bodyPr>
+          <a:lstStyle/>
+          <a:p>
+            <a:r>
+              <a:rPr lang="lt-LT" sz="2200" b="1" dirty="0">
+                <a:solidFill>
+                  <a:srgbClr val="FF0000"/>
+                </a:solidFill>
+                <a:latin typeface="Aharoni" panose="02010803020104030203" pitchFamily="2" charset="-79"/>
+                <a:cs typeface="Aharoni" panose="02010803020104030203" pitchFamily="2" charset="-79"/>
+              </a:rPr>
+              <a:t>8</a:t>
             </a:r>
           </a:p>
         </p:txBody>
@@ -26798,7 +25226,7 @@
     </p:spTree>
     <p:extLst>
       <p:ext uri="{BB962C8B-B14F-4D97-AF65-F5344CB8AC3E}">
-        <p14:creationId xmlns:p14="http://schemas.microsoft.com/office/powerpoint/2010/main" val="2233306386"/>
+        <p14:creationId xmlns:p14="http://schemas.microsoft.com/office/powerpoint/2010/main" val="3040414361"/>
       </p:ext>
     </p:extLst>
   </p:cSld>
@@ -26848,7 +25276,7 @@
           <a:p>
             <a:r>
               <a:rPr lang="lt-LT" dirty="0"/>
-              <a:t>Netinkama statistika</a:t>
+              <a:t>Swarm Sat</a:t>
             </a:r>
           </a:p>
         </p:txBody>
@@ -27077,10 +25505,10 @@
       </p:sp>
       <p:pic>
         <p:nvPicPr>
-          <p:cNvPr id="1030" name="Picture 6" descr="Starlink: Elon Musk's satellites to beam high-speed broadband to remote  areas of UK in government trial | Science &amp; Tech News | Sky News">
+          <p:cNvPr id="1026" name="Picture 2" descr="Artist's impression of the three Swarm satellite orbital configuration. Two fly initially at an altitude of 450 km while the third flies at 530 km. Each satellite consist of a solar-panel covered body from which a four-metre boom with the magnetic field measuring instruments extends out the rear. Copyright: ESA/AOES Medialab.">
             <a:extLst>
               <a:ext uri="{FF2B5EF4-FFF2-40B4-BE49-F238E27FC236}">
-                <a16:creationId xmlns:a16="http://schemas.microsoft.com/office/drawing/2014/main" id="{05BE9994-507E-FA0C-BA01-DCE37CA13362}"/>
+                <a16:creationId xmlns:a16="http://schemas.microsoft.com/office/drawing/2014/main" id="{0FA4E0B1-F2DD-DC98-18AA-B94AF9BF2B8B}"/>
               </a:ext>
             </a:extLst>
           </p:cNvPr>
@@ -27104,55 +25532,8 @@
         </p:blipFill>
         <p:spPr bwMode="auto">
           <a:xfrm>
-            <a:off x="33402" y="3212926"/>
-            <a:ext cx="6480132" cy="3645074"/>
-          </a:xfrm>
-          <a:prstGeom prst="rect">
-            <a:avLst/>
-          </a:prstGeom>
-          <a:noFill/>
-          <a:extLst>
-            <a:ext uri="{909E8E84-426E-40DD-AFC4-6F175D3DCCD1}">
-              <a14:hiddenFill xmlns:a14="http://schemas.microsoft.com/office/drawing/2010/main">
-                <a:solidFill>
-                  <a:srgbClr val="FFFFFF"/>
-                </a:solidFill>
-              </a14:hiddenFill>
-            </a:ext>
-          </a:extLst>
-        </p:spPr>
-      </p:pic>
-      <p:pic>
-        <p:nvPicPr>
-          <p:cNvPr id="7" name="Picture 2" descr="Understanding GNSS Orbits - News - SparkFun Electronics">
-            <a:extLst>
-              <a:ext uri="{FF2B5EF4-FFF2-40B4-BE49-F238E27FC236}">
-                <a16:creationId xmlns:a16="http://schemas.microsoft.com/office/drawing/2014/main" id="{BB5CBD14-15EA-63EA-C9A8-BE7460B2E619}"/>
-              </a:ext>
-            </a:extLst>
-          </p:cNvPr>
-          <p:cNvPicPr>
-            <a:picLocks noChangeAspect="1" noChangeArrowheads="1"/>
-          </p:cNvPicPr>
-          <p:nvPr/>
-        </p:nvPicPr>
-        <p:blipFill>
-          <a:blip r:embed="rId3">
-            <a:extLst>
-              <a:ext uri="{28A0092B-C50C-407E-A947-70E740481C1C}">
-                <a14:useLocalDpi xmlns:a14="http://schemas.microsoft.com/office/drawing/2010/main" val="0"/>
-              </a:ext>
-            </a:extLst>
-          </a:blip>
-          <a:srcRect/>
-          <a:stretch>
-            <a:fillRect/>
-          </a:stretch>
-        </p:blipFill>
-        <p:spPr bwMode="auto">
-          <a:xfrm>
-            <a:off x="6714593" y="2283212"/>
-            <a:ext cx="5283444" cy="3480028"/>
+            <a:off x="5549731" y="2804154"/>
+            <a:ext cx="3762945" cy="4053846"/>
           </a:xfrm>
           <a:prstGeom prst="rect">
             <a:avLst/>
@@ -27222,94 +25603,17 @@
           <a:p>
             <a:r>
               <a:rPr lang="lt-LT" dirty="0"/>
-              <a:t>Kubinių palydovų patikimumas</a:t>
+              <a:t>Vibracijos testai</a:t>
             </a:r>
           </a:p>
         </p:txBody>
       </p:sp>
-      <p:pic>
-        <p:nvPicPr>
-          <p:cNvPr id="4" name="Picture 4" descr="NASA to fly CubeSats on three new commercial launchers – Spaceflight Now">
+      <p:sp>
+        <p:nvSpPr>
+          <p:cNvPr id="3" name="Text Placeholder 3">
             <a:extLst>
               <a:ext uri="{FF2B5EF4-FFF2-40B4-BE49-F238E27FC236}">
-                <a16:creationId xmlns:a16="http://schemas.microsoft.com/office/drawing/2014/main" id="{834D6581-CA7A-8F8F-683E-777F9DD87404}"/>
-              </a:ext>
-            </a:extLst>
-          </p:cNvPr>
-          <p:cNvPicPr>
-            <a:picLocks noChangeAspect="1" noChangeArrowheads="1"/>
-          </p:cNvPicPr>
-          <p:nvPr/>
-        </p:nvPicPr>
-        <p:blipFill>
-          <a:blip r:embed="rId2">
-            <a:extLst>
-              <a:ext uri="{28A0092B-C50C-407E-A947-70E740481C1C}">
-                <a14:useLocalDpi xmlns:a14="http://schemas.microsoft.com/office/drawing/2010/main" val="0"/>
-              </a:ext>
-            </a:extLst>
-          </a:blip>
-          <a:srcRect/>
-          <a:stretch>
-            <a:fillRect/>
-          </a:stretch>
-        </p:blipFill>
-        <p:spPr bwMode="auto">
-          <a:xfrm>
-            <a:off x="6433826" y="3188252"/>
-            <a:ext cx="4962729" cy="3545950"/>
-          </a:xfrm>
-          <a:prstGeom prst="rect">
-            <a:avLst/>
-          </a:prstGeom>
-          <a:noFill/>
-          <a:extLst>
-            <a:ext uri="{909E8E84-426E-40DD-AFC4-6F175D3DCCD1}">
-              <a14:hiddenFill xmlns:a14="http://schemas.microsoft.com/office/drawing/2010/main">
-                <a:solidFill>
-                  <a:srgbClr val="FFFFFF"/>
-                </a:solidFill>
-              </a14:hiddenFill>
-            </a:ext>
-          </a:extLst>
-        </p:spPr>
-      </p:pic>
-      <p:pic>
-        <p:nvPicPr>
-          <p:cNvPr id="5" name="Picture 4" descr="Chart&#10;&#10;Description automatically generated">
-            <a:extLst>
-              <a:ext uri="{FF2B5EF4-FFF2-40B4-BE49-F238E27FC236}">
-                <a16:creationId xmlns:a16="http://schemas.microsoft.com/office/drawing/2014/main" id="{B5B30B63-E4CB-8913-72F8-C07AA3CDB8D4}"/>
-              </a:ext>
-            </a:extLst>
-          </p:cNvPr>
-          <p:cNvPicPr>
-            <a:picLocks noChangeAspect="1"/>
-          </p:cNvPicPr>
-          <p:nvPr/>
-        </p:nvPicPr>
-        <p:blipFill>
-          <a:blip r:embed="rId3"/>
-          <a:stretch>
-            <a:fillRect/>
-          </a:stretch>
-        </p:blipFill>
-        <p:spPr>
-          <a:xfrm>
-            <a:off x="337827" y="2882516"/>
-            <a:ext cx="5758174" cy="3851686"/>
-          </a:xfrm>
-          <a:prstGeom prst="rect">
-            <a:avLst/>
-          </a:prstGeom>
-        </p:spPr>
-      </p:pic>
-      <p:sp>
-        <p:nvSpPr>
-          <p:cNvPr id="6" name="Text Placeholder 3">
-            <a:extLst>
-              <a:ext uri="{FF2B5EF4-FFF2-40B4-BE49-F238E27FC236}">
-                <a16:creationId xmlns:a16="http://schemas.microsoft.com/office/drawing/2014/main" id="{CE4268F0-7D88-5F06-CD9F-D19D9A623CC7}"/>
+                <a16:creationId xmlns:a16="http://schemas.microsoft.com/office/drawing/2014/main" id="{121F8870-B73B-27B6-5FF2-A04C8774E1AA}"/>
               </a:ext>
             </a:extLst>
           </p:cNvPr>
@@ -27320,8 +25624,8 @@
         </p:nvSpPr>
         <p:spPr>
           <a:xfrm>
-            <a:off x="337827" y="1596979"/>
-            <a:ext cx="11085734" cy="1150572"/>
+            <a:off x="456339" y="1641763"/>
+            <a:ext cx="5767816" cy="3990109"/>
           </a:xfrm>
           <a:prstGeom prst="rect">
             <a:avLst/>
@@ -27497,29 +25801,103 @@
             </a:lvl9pPr>
           </a:lstStyle>
           <a:p>
-            <a:pPr marL="342900" indent="-342900">
+            <a:pPr marL="342900" indent="-342900" algn="just">
               <a:buFont typeface="Arial" panose="020B0604020202020204" pitchFamily="34" charset="0"/>
               <a:buChar char="•"/>
             </a:pPr>
             <a:r>
               <a:rPr lang="lt-LT" b="0" dirty="0"/>
-              <a:t>Remiantis literatūros šaltinais,  mažųjų palydovų patikimumas kelia susirūpinimą ir </a:t>
-            </a:r>
-            <a:r>
-              <a:rPr lang="lt-LT" dirty="0"/>
-              <a:t>gedimai dažnai įvyksta ankstyvoje misijos stadijoje </a:t>
-            </a:r>
+              <a:t>Visiems pagamintiems palydovams yra vykdomi sistemos lygio mechaniniai bandymai atliekant vibracijos bandymus.</a:t>
+            </a:r>
+          </a:p>
+          <a:p>
+            <a:pPr marL="342900" indent="-342900" algn="just">
+              <a:buFont typeface="Arial" panose="020B0604020202020204" pitchFamily="34" charset="0"/>
+              <a:buChar char="•"/>
+            </a:pPr>
             <a:r>
               <a:rPr lang="lt-LT" b="0" dirty="0"/>
-              <a:t>– pirmaisiais mėnesiais, kai misijos numatyta trukmė yra metai ar daugiau.</a:t>
+              <a:t>Kaip vienas iš reikalavimų pavyzdžių yra natūralusis raketos virpėjimo dažnis (angl. </a:t>
+            </a:r>
+            <a:r>
+              <a:rPr lang="lt-LT" b="0" i="1" dirty="0" err="1"/>
+              <a:t>minimum</a:t>
+            </a:r>
+            <a:r>
+              <a:rPr lang="lt-LT" b="0" i="1" dirty="0"/>
+              <a:t> </a:t>
+            </a:r>
+            <a:r>
+              <a:rPr lang="lt-LT" b="0" i="1" dirty="0" err="1"/>
+              <a:t>first</a:t>
+            </a:r>
+            <a:r>
+              <a:rPr lang="lt-LT" b="0" i="1" dirty="0"/>
+              <a:t> </a:t>
+            </a:r>
+            <a:r>
+              <a:rPr lang="lt-LT" b="0" i="1" dirty="0" err="1"/>
+              <a:t>natural</a:t>
+            </a:r>
+            <a:r>
+              <a:rPr lang="lt-LT" b="0" i="1" dirty="0"/>
+              <a:t> </a:t>
+            </a:r>
+            <a:r>
+              <a:rPr lang="lt-LT" b="0" i="1" dirty="0" err="1"/>
+              <a:t>frequency</a:t>
+            </a:r>
+            <a:r>
+              <a:rPr lang="lt-LT" b="0" dirty="0"/>
+              <a:t>). </a:t>
+            </a:r>
+          </a:p>
+          <a:p>
+            <a:pPr marL="342900" indent="-342900" algn="just">
+              <a:buFont typeface="Arial" panose="020B0604020202020204" pitchFamily="34" charset="0"/>
+              <a:buChar char="•"/>
+            </a:pPr>
+            <a:r>
+              <a:rPr lang="lt-LT" b="0" dirty="0"/>
+              <a:t>Detaliau vibracijos testai naudojami imituojant žemo dažnio virpesius, kuriuos sukelia raketa paleidimo metu.</a:t>
             </a:r>
           </a:p>
         </p:txBody>
       </p:sp>
+      <p:pic>
+        <p:nvPicPr>
+          <p:cNvPr id="7" name="Picture 6">
+            <a:extLst>
+              <a:ext uri="{FF2B5EF4-FFF2-40B4-BE49-F238E27FC236}">
+                <a16:creationId xmlns:a16="http://schemas.microsoft.com/office/drawing/2014/main" id="{5D21ECCC-41FC-61C0-222E-C1C4FB61E6E6}"/>
+              </a:ext>
+            </a:extLst>
+          </p:cNvPr>
+          <p:cNvPicPr>
+            <a:picLocks noChangeAspect="1"/>
+          </p:cNvPicPr>
+          <p:nvPr/>
+        </p:nvPicPr>
+        <p:blipFill>
+          <a:blip r:embed="rId2"/>
+          <a:stretch>
+            <a:fillRect/>
+          </a:stretch>
+        </p:blipFill>
+        <p:spPr>
+          <a:xfrm>
+            <a:off x="6325898" y="1693718"/>
+            <a:ext cx="5095875" cy="4969739"/>
+          </a:xfrm>
+          <a:prstGeom prst="rect">
+            <a:avLst/>
+          </a:prstGeom>
+        </p:spPr>
+      </p:pic>
     </p:spTree>
     <p:extLst>
       <p:ext uri="{BB962C8B-B14F-4D97-AF65-F5344CB8AC3E}">
-        <p14:creationId xmlns:p14="http://schemas.microsoft.com/office/powerpoint/2010/main" val="3104627178"/>
+        <p14:creationId xmlns:p14="http://schemas.microsoft.com/office/powerpoint/2010/main" val="1801342797"/>
       </p:ext>
     </p:extLst>
   </p:cSld>
@@ -27546,53 +25924,6 @@
           <a:chExt cx="0" cy="0"/>
         </a:xfrm>
       </p:grpSpPr>
-      <p:pic>
-        <p:nvPicPr>
-          <p:cNvPr id="5126" name="Picture 6" descr="Falcon 9 Takes Left Turn at Equator for NASA | CosmoQuest">
-            <a:extLst>
-              <a:ext uri="{FF2B5EF4-FFF2-40B4-BE49-F238E27FC236}">
-                <a16:creationId xmlns:a16="http://schemas.microsoft.com/office/drawing/2014/main" id="{B13EAD72-471E-E137-D5B8-D1988851D348}"/>
-              </a:ext>
-            </a:extLst>
-          </p:cNvPr>
-          <p:cNvPicPr>
-            <a:picLocks noChangeAspect="1" noChangeArrowheads="1"/>
-          </p:cNvPicPr>
-          <p:nvPr/>
-        </p:nvPicPr>
-        <p:blipFill>
-          <a:blip r:embed="rId2">
-            <a:extLst>
-              <a:ext uri="{28A0092B-C50C-407E-A947-70E740481C1C}">
-                <a14:useLocalDpi xmlns:a14="http://schemas.microsoft.com/office/drawing/2010/main" val="0"/>
-              </a:ext>
-            </a:extLst>
-          </a:blip>
-          <a:srcRect/>
-          <a:stretch>
-            <a:fillRect/>
-          </a:stretch>
-        </p:blipFill>
-        <p:spPr bwMode="auto">
-          <a:xfrm>
-            <a:off x="5324341" y="2279561"/>
-            <a:ext cx="6867659" cy="4578439"/>
-          </a:xfrm>
-          <a:prstGeom prst="rect">
-            <a:avLst/>
-          </a:prstGeom>
-          <a:noFill/>
-          <a:extLst>
-            <a:ext uri="{909E8E84-426E-40DD-AFC4-6F175D3DCCD1}">
-              <a14:hiddenFill xmlns:a14="http://schemas.microsoft.com/office/drawing/2010/main">
-                <a:solidFill>
-                  <a:srgbClr val="FFFFFF"/>
-                </a:solidFill>
-              </a14:hiddenFill>
-            </a:ext>
-          </a:extLst>
-        </p:spPr>
-      </p:pic>
       <p:sp>
         <p:nvSpPr>
           <p:cNvPr id="2" name="Text Placeholder 1">
@@ -27616,7 +25947,7 @@
           <a:p>
             <a:r>
               <a:rPr lang="lt-LT" dirty="0"/>
-              <a:t>Poveikiai kosmose</a:t>
+              <a:t>Radiacijos ir šiluminio vakuumo testai</a:t>
             </a:r>
           </a:p>
         </p:txBody>
@@ -27637,8 +25968,8 @@
         </p:nvSpPr>
         <p:spPr>
           <a:xfrm>
-            <a:off x="456339" y="1641764"/>
-            <a:ext cx="8978606" cy="1693718"/>
+            <a:off x="72736" y="1735282"/>
+            <a:ext cx="6993081" cy="4831774"/>
           </a:xfrm>
           <a:prstGeom prst="rect">
             <a:avLst/>
@@ -27814,342 +26145,172 @@
             </a:lvl9pPr>
           </a:lstStyle>
           <a:p>
-            <a:pPr marL="342900" indent="-342900">
+            <a:pPr marL="342900" indent="-342900" algn="just">
               <a:buFont typeface="Arial" panose="020B0604020202020204" pitchFamily="34" charset="0"/>
               <a:buChar char="•"/>
             </a:pPr>
             <a:r>
-              <a:rPr lang="lt-LT" dirty="0"/>
-              <a:t>Paleidimo metu </a:t>
-            </a:r>
-            <a:r>
-              <a:rPr lang="lt-LT" b="0" dirty="0"/>
-              <a:t>palydovai patiria itin didelį </a:t>
-            </a:r>
-            <a:r>
-              <a:rPr lang="lt-LT" dirty="0"/>
-              <a:t>vibracijos ir akustinio triukšmo lygį</a:t>
-            </a:r>
-            <a:r>
-              <a:rPr lang="lt-LT" b="0" dirty="0"/>
-              <a:t>, kuris gali pakenkti arba net sugadinti komponentus.</a:t>
+              <a:rPr lang="lt-LT" sz="2000" b="0" dirty="0"/>
+              <a:t>Vieno įvykio efektai yra labai pavojingi gali sukelti bitų klaidas arba įrenginio užblokavimą (angl. </a:t>
+            </a:r>
+            <a:r>
+              <a:rPr lang="lt-LT" sz="2000" b="0" dirty="0" err="1"/>
+              <a:t>latch-up</a:t>
+            </a:r>
+            <a:r>
+              <a:rPr lang="lt-LT" sz="2000" b="0" dirty="0"/>
+              <a:t>). </a:t>
             </a:r>
           </a:p>
           <a:p>
-            <a:pPr marL="342900" indent="-342900">
+            <a:pPr marL="342900" indent="-342900" algn="just">
               <a:buFont typeface="Arial" panose="020B0604020202020204" pitchFamily="34" charset="0"/>
               <a:buChar char="•"/>
             </a:pPr>
             <a:r>
-              <a:rPr lang="lt-LT" b="0" dirty="0"/>
+              <a:rPr lang="lt-LT" sz="2000" b="0" dirty="0"/>
+              <a:t>Mažieji palydovai dažniausiai yra surenkami iš </a:t>
+            </a:r>
+            <a:r>
+              <a:rPr lang="lt-LT" sz="2000" dirty="0"/>
+              <a:t>įprastų elektronikos</a:t>
+            </a:r>
+            <a:r>
+              <a:rPr lang="lt-LT" sz="2000" b="0" dirty="0"/>
+              <a:t> (angl. </a:t>
+            </a:r>
+            <a:r>
+              <a:rPr lang="lt-LT" sz="2000" b="0" dirty="0" err="1"/>
+              <a:t>comercial</a:t>
+            </a:r>
+            <a:r>
+              <a:rPr lang="lt-LT" sz="2000" b="0" dirty="0"/>
               <a:t> </a:t>
             </a:r>
             <a:r>
-              <a:rPr lang="lt-LT" dirty="0"/>
-              <a:t>Radiacija</a:t>
-            </a:r>
-            <a:r>
-              <a:rPr lang="lt-LT" b="0" dirty="0"/>
-              <a:t> gali sukelti įvairių problemų: nuo veikimo sutrikimų iki fizinių prietaisų pažeidimų. </a:t>
+              <a:rPr lang="lt-LT" sz="2000" b="0" dirty="0" err="1"/>
+              <a:t>of</a:t>
+            </a:r>
+            <a:r>
+              <a:rPr lang="lt-LT" sz="2000" b="0" dirty="0"/>
+              <a:t> </a:t>
+            </a:r>
+            <a:r>
+              <a:rPr lang="lt-LT" sz="2000" b="0" dirty="0" err="1"/>
+              <a:t>the</a:t>
+            </a:r>
+            <a:r>
+              <a:rPr lang="lt-LT" sz="2000" b="0" dirty="0"/>
+              <a:t> </a:t>
+            </a:r>
+            <a:r>
+              <a:rPr lang="lt-LT" sz="2000" b="0" dirty="0" err="1"/>
+              <a:t>shefl</a:t>
+            </a:r>
+            <a:r>
+              <a:rPr lang="lt-LT" sz="2000" b="0" dirty="0"/>
+              <a:t> – COTS), </a:t>
+            </a:r>
+            <a:r>
+              <a:rPr lang="lt-LT" sz="2000" dirty="0"/>
+              <a:t>komponentų</a:t>
+            </a:r>
+            <a:r>
+              <a:rPr lang="lt-LT" sz="2000" b="0" dirty="0"/>
+              <a:t> (siekiant užtikrinti greitą gamybos procesą ir maža kainą), jie nėra išskirtinai atsparūs radiacijai.</a:t>
+            </a:r>
+          </a:p>
+          <a:p>
+            <a:pPr algn="just"/>
+            <a:endParaRPr lang="lt-LT" sz="2000" b="0" dirty="0"/>
+          </a:p>
+          <a:p>
+            <a:pPr marL="342900" indent="-342900" algn="just">
+              <a:buFont typeface="Arial" panose="020B0604020202020204" pitchFamily="34" charset="0"/>
+              <a:buChar char="•"/>
+            </a:pPr>
+            <a:r>
+              <a:rPr lang="lt-LT" sz="2000" b="0" dirty="0" err="1"/>
+              <a:t>Tvacc</a:t>
+            </a:r>
+            <a:r>
+              <a:rPr lang="lt-LT" sz="2000" b="0" dirty="0"/>
+              <a:t> testai - patikrinti palydovo veikimą kosminėje aplinkoje kuri pasižymi </a:t>
+            </a:r>
+            <a:r>
+              <a:rPr lang="lt-LT" sz="2000" dirty="0"/>
+              <a:t>dideliais temperatūros svyravimais.</a:t>
+            </a:r>
+            <a:r>
+              <a:rPr lang="lt-LT" sz="2000" b="0" dirty="0"/>
+              <a:t> </a:t>
+            </a:r>
+          </a:p>
+          <a:p>
+            <a:pPr marL="342900" indent="-342900" algn="just">
+              <a:buFont typeface="Arial" panose="020B0604020202020204" pitchFamily="34" charset="0"/>
+              <a:buChar char="•"/>
+            </a:pPr>
+            <a:r>
+              <a:rPr lang="lt-LT" sz="2000" b="0" dirty="0"/>
+              <a:t>Kitas svarbus veiksnys kosmoso pramonėje yra dujų pasišalinimo procesas (angl. </a:t>
+            </a:r>
+            <a:r>
+              <a:rPr lang="lt-LT" sz="2000" dirty="0" err="1"/>
+              <a:t>outgassing</a:t>
+            </a:r>
+            <a:r>
+              <a:rPr lang="lt-LT" sz="2000" b="0" dirty="0"/>
+              <a:t>) </a:t>
+            </a:r>
+          </a:p>
+          <a:p>
+            <a:pPr algn="just"/>
+            <a:endParaRPr lang="lt-LT" sz="2000" b="0" dirty="0"/>
+          </a:p>
+          <a:p>
+            <a:pPr algn="just"/>
+            <a:r>
+              <a:rPr lang="lt-LT" sz="2000" b="0" dirty="0"/>
+              <a:t> </a:t>
             </a:r>
           </a:p>
         </p:txBody>
       </p:sp>
-      <p:sp>
-        <p:nvSpPr>
-          <p:cNvPr id="6" name="Text Placeholder 3">
+      <p:pic>
+        <p:nvPicPr>
+          <p:cNvPr id="4" name="Picture 3">
             <a:extLst>
               <a:ext uri="{FF2B5EF4-FFF2-40B4-BE49-F238E27FC236}">
-                <a16:creationId xmlns:a16="http://schemas.microsoft.com/office/drawing/2014/main" id="{A4ADE6AA-E2DA-99A0-DE14-EBD535625A50}"/>
+                <a16:creationId xmlns:a16="http://schemas.microsoft.com/office/drawing/2014/main" id="{D5E25678-B7DA-357F-1DBC-A7E42BC5D381}"/>
               </a:ext>
             </a:extLst>
           </p:cNvPr>
-          <p:cNvSpPr txBox="1">
-            <a:spLocks/>
-          </p:cNvSpPr>
+          <p:cNvPicPr>
+            <a:picLocks noChangeAspect="1"/>
+          </p:cNvPicPr>
           <p:nvPr/>
-        </p:nvSpPr>
+        </p:nvPicPr>
+        <p:blipFill>
+          <a:blip r:embed="rId2"/>
+          <a:stretch>
+            <a:fillRect/>
+          </a:stretch>
+        </p:blipFill>
         <p:spPr>
           <a:xfrm>
-            <a:off x="456339" y="3335482"/>
-            <a:ext cx="4868002" cy="2730467"/>
+            <a:off x="7183054" y="1647541"/>
+            <a:ext cx="4163817" cy="5210459"/>
           </a:xfrm>
           <a:prstGeom prst="rect">
             <a:avLst/>
           </a:prstGeom>
         </p:spPr>
-        <p:txBody>
-          <a:bodyPr anchor="b"/>
-          <a:lstStyle>
-            <a:lvl1pPr marL="0" indent="0" algn="l" defTabSz="914400" rtl="0" eaLnBrk="1" latinLnBrk="0" hangingPunct="1">
-              <a:lnSpc>
-                <a:spcPct val="110000"/>
-              </a:lnSpc>
-              <a:spcBef>
-                <a:spcPts val="0"/>
-              </a:spcBef>
-              <a:spcAft>
-                <a:spcPts val="0"/>
-              </a:spcAft>
-              <a:buFont typeface="+mj-lt"/>
-              <a:buNone/>
-              <a:defRPr sz="2200" b="1" i="0" kern="1200">
-                <a:solidFill>
-                  <a:schemeClr val="bg1"/>
-                </a:solidFill>
-                <a:latin typeface="Arial" panose="020B0604020202020204" pitchFamily="34" charset="0"/>
-                <a:ea typeface="Inter Medium" panose="020B0502030000000004" pitchFamily="34" charset="0"/>
-                <a:cs typeface="Arial" panose="020B0604020202020204" pitchFamily="34" charset="0"/>
-              </a:defRPr>
-            </a:lvl1pPr>
-            <a:lvl2pPr marL="685800" indent="-228600" algn="l" defTabSz="914400" rtl="0" eaLnBrk="1" latinLnBrk="0" hangingPunct="1">
-              <a:lnSpc>
-                <a:spcPct val="90000"/>
-              </a:lnSpc>
-              <a:spcBef>
-                <a:spcPts val="500"/>
-              </a:spcBef>
-              <a:buFont typeface="Arial" panose="020B0604020202020204" pitchFamily="34" charset="0"/>
-              <a:buChar char="•"/>
-              <a:defRPr sz="2400" kern="1200">
-                <a:solidFill>
-                  <a:schemeClr val="tx1"/>
-                </a:solidFill>
-                <a:latin typeface="+mn-lt"/>
-                <a:ea typeface="+mn-ea"/>
-                <a:cs typeface="+mn-cs"/>
-              </a:defRPr>
-            </a:lvl2pPr>
-            <a:lvl3pPr marL="1143000" indent="-228600" algn="l" defTabSz="914400" rtl="0" eaLnBrk="1" latinLnBrk="0" hangingPunct="1">
-              <a:lnSpc>
-                <a:spcPct val="90000"/>
-              </a:lnSpc>
-              <a:spcBef>
-                <a:spcPts val="500"/>
-              </a:spcBef>
-              <a:buFont typeface="Arial" panose="020B0604020202020204" pitchFamily="34" charset="0"/>
-              <a:buChar char="•"/>
-              <a:defRPr sz="2000" kern="1200">
-                <a:solidFill>
-                  <a:schemeClr val="tx1"/>
-                </a:solidFill>
-                <a:latin typeface="+mn-lt"/>
-                <a:ea typeface="+mn-ea"/>
-                <a:cs typeface="+mn-cs"/>
-              </a:defRPr>
-            </a:lvl3pPr>
-            <a:lvl4pPr marL="1600200" indent="-228600" algn="l" defTabSz="914400" rtl="0" eaLnBrk="1" latinLnBrk="0" hangingPunct="1">
-              <a:lnSpc>
-                <a:spcPct val="90000"/>
-              </a:lnSpc>
-              <a:spcBef>
-                <a:spcPts val="500"/>
-              </a:spcBef>
-              <a:buFont typeface="Arial" panose="020B0604020202020204" pitchFamily="34" charset="0"/>
-              <a:buChar char="•"/>
-              <a:defRPr sz="1800" kern="1200">
-                <a:solidFill>
-                  <a:schemeClr val="tx1"/>
-                </a:solidFill>
-                <a:latin typeface="+mn-lt"/>
-                <a:ea typeface="+mn-ea"/>
-                <a:cs typeface="+mn-cs"/>
-              </a:defRPr>
-            </a:lvl4pPr>
-            <a:lvl5pPr marL="2057400" indent="-228600" algn="l" defTabSz="914400" rtl="0" eaLnBrk="1" latinLnBrk="0" hangingPunct="1">
-              <a:lnSpc>
-                <a:spcPct val="90000"/>
-              </a:lnSpc>
-              <a:spcBef>
-                <a:spcPts val="500"/>
-              </a:spcBef>
-              <a:buFont typeface="Arial" panose="020B0604020202020204" pitchFamily="34" charset="0"/>
-              <a:buChar char="•"/>
-              <a:defRPr sz="1800" kern="1200">
-                <a:solidFill>
-                  <a:schemeClr val="tx1"/>
-                </a:solidFill>
-                <a:latin typeface="+mn-lt"/>
-                <a:ea typeface="+mn-ea"/>
-                <a:cs typeface="+mn-cs"/>
-              </a:defRPr>
-            </a:lvl5pPr>
-            <a:lvl6pPr marL="2514600" indent="-228600" algn="l" defTabSz="914400" rtl="0" eaLnBrk="1" latinLnBrk="0" hangingPunct="1">
-              <a:lnSpc>
-                <a:spcPct val="90000"/>
-              </a:lnSpc>
-              <a:spcBef>
-                <a:spcPts val="500"/>
-              </a:spcBef>
-              <a:buFont typeface="Arial" panose="020B0604020202020204" pitchFamily="34" charset="0"/>
-              <a:buChar char="•"/>
-              <a:defRPr sz="1800" kern="1200">
-                <a:solidFill>
-                  <a:schemeClr val="tx1"/>
-                </a:solidFill>
-                <a:latin typeface="+mn-lt"/>
-                <a:ea typeface="+mn-ea"/>
-                <a:cs typeface="+mn-cs"/>
-              </a:defRPr>
-            </a:lvl6pPr>
-            <a:lvl7pPr marL="2971800" indent="-228600" algn="l" defTabSz="914400" rtl="0" eaLnBrk="1" latinLnBrk="0" hangingPunct="1">
-              <a:lnSpc>
-                <a:spcPct val="90000"/>
-              </a:lnSpc>
-              <a:spcBef>
-                <a:spcPts val="500"/>
-              </a:spcBef>
-              <a:buFont typeface="Arial" panose="020B0604020202020204" pitchFamily="34" charset="0"/>
-              <a:buChar char="•"/>
-              <a:defRPr sz="1800" kern="1200">
-                <a:solidFill>
-                  <a:schemeClr val="tx1"/>
-                </a:solidFill>
-                <a:latin typeface="+mn-lt"/>
-                <a:ea typeface="+mn-ea"/>
-                <a:cs typeface="+mn-cs"/>
-              </a:defRPr>
-            </a:lvl7pPr>
-            <a:lvl8pPr marL="3429000" indent="-228600" algn="l" defTabSz="914400" rtl="0" eaLnBrk="1" latinLnBrk="0" hangingPunct="1">
-              <a:lnSpc>
-                <a:spcPct val="90000"/>
-              </a:lnSpc>
-              <a:spcBef>
-                <a:spcPts val="500"/>
-              </a:spcBef>
-              <a:buFont typeface="Arial" panose="020B0604020202020204" pitchFamily="34" charset="0"/>
-              <a:buChar char="•"/>
-              <a:defRPr sz="1800" kern="1200">
-                <a:solidFill>
-                  <a:schemeClr val="tx1"/>
-                </a:solidFill>
-                <a:latin typeface="+mn-lt"/>
-                <a:ea typeface="+mn-ea"/>
-                <a:cs typeface="+mn-cs"/>
-              </a:defRPr>
-            </a:lvl8pPr>
-            <a:lvl9pPr marL="3886200" indent="-228600" algn="l" defTabSz="914400" rtl="0" eaLnBrk="1" latinLnBrk="0" hangingPunct="1">
-              <a:lnSpc>
-                <a:spcPct val="90000"/>
-              </a:lnSpc>
-              <a:spcBef>
-                <a:spcPts val="500"/>
-              </a:spcBef>
-              <a:buFont typeface="Arial" panose="020B0604020202020204" pitchFamily="34" charset="0"/>
-              <a:buChar char="•"/>
-              <a:defRPr sz="1800" kern="1200">
-                <a:solidFill>
-                  <a:schemeClr val="tx1"/>
-                </a:solidFill>
-                <a:latin typeface="+mn-lt"/>
-                <a:ea typeface="+mn-ea"/>
-                <a:cs typeface="+mn-cs"/>
-              </a:defRPr>
-            </a:lvl9pPr>
-          </a:lstStyle>
-          <a:p>
-            <a:r>
-              <a:rPr lang="lt-LT" b="0" dirty="0"/>
-              <a:t>Atliekami testai:</a:t>
-            </a:r>
-          </a:p>
-          <a:p>
-            <a:pPr marL="342900" indent="-342900">
-              <a:buFont typeface="Arial" panose="020B0604020202020204" pitchFamily="34" charset="0"/>
-              <a:buChar char="•"/>
-            </a:pPr>
-            <a:r>
-              <a:rPr lang="lt-LT" b="0" dirty="0"/>
-              <a:t>Vibracijų</a:t>
-            </a:r>
-          </a:p>
-          <a:p>
-            <a:pPr marL="342900" indent="-342900">
-              <a:buFont typeface="Arial" panose="020B0604020202020204" pitchFamily="34" charset="0"/>
-              <a:buChar char="•"/>
-            </a:pPr>
-            <a:r>
-              <a:rPr lang="lt-LT" b="0" dirty="0"/>
-              <a:t>Radiacijos</a:t>
-            </a:r>
-          </a:p>
-          <a:p>
-            <a:pPr marL="342900" indent="-342900">
-              <a:buFont typeface="Arial" panose="020B0604020202020204" pitchFamily="34" charset="0"/>
-              <a:buChar char="•"/>
-            </a:pPr>
-            <a:r>
-              <a:rPr lang="lt-LT" b="0" dirty="0"/>
-              <a:t>Šiluminio vakuumo</a:t>
-            </a:r>
-          </a:p>
-          <a:p>
-            <a:pPr marL="342900" indent="-342900">
-              <a:buFont typeface="Arial" panose="020B0604020202020204" pitchFamily="34" charset="0"/>
-              <a:buChar char="•"/>
-            </a:pPr>
-            <a:r>
-              <a:rPr lang="lt-LT" b="0" dirty="0"/>
-              <a:t>Modeliavimas/simuliacijos (HIL)</a:t>
-            </a:r>
-          </a:p>
-          <a:p>
-            <a:pPr marL="342900" indent="-342900">
-              <a:buFont typeface="Arial" panose="020B0604020202020204" pitchFamily="34" charset="0"/>
-              <a:buChar char="•"/>
-            </a:pPr>
-            <a:r>
-              <a:rPr lang="lt-LT" sz="1600" b="0" i="1" dirty="0"/>
-              <a:t>Standartiniai elektronikos (elektromagnetinio suderinamumo ir komunikacijos antenos testai) </a:t>
-            </a:r>
-          </a:p>
-        </p:txBody>
-      </p:sp>
-      <p:sp>
-        <p:nvSpPr>
-          <p:cNvPr id="7" name="TextBox 6">
-            <a:extLst>
-              <a:ext uri="{FF2B5EF4-FFF2-40B4-BE49-F238E27FC236}">
-                <a16:creationId xmlns:a16="http://schemas.microsoft.com/office/drawing/2014/main" id="{2D4BBA8F-A360-2C4F-2C1E-6E9FEB6C8E5E}"/>
-              </a:ext>
-            </a:extLst>
-          </p:cNvPr>
-          <p:cNvSpPr txBox="1"/>
-          <p:nvPr/>
-        </p:nvSpPr>
-        <p:spPr>
-          <a:xfrm>
-            <a:off x="11477297" y="6299901"/>
-            <a:ext cx="304549" cy="430887"/>
-          </a:xfrm>
-          <a:prstGeom prst="rect">
-            <a:avLst/>
-          </a:prstGeom>
-          <a:noFill/>
-        </p:spPr>
-        <p:txBody>
-          <a:bodyPr wrap="square" rtlCol="0">
-            <a:spAutoFit/>
-          </a:bodyPr>
-          <a:lstStyle/>
-          <a:p>
-            <a:r>
-              <a:rPr lang="lt-LT" sz="2200" b="1" dirty="0">
-                <a:solidFill>
-                  <a:schemeClr val="bg1"/>
-                </a:solidFill>
-                <a:latin typeface="Aharoni" panose="02010803020104030203" pitchFamily="2" charset="-79"/>
-                <a:cs typeface="Aharoni" panose="02010803020104030203" pitchFamily="2" charset="-79"/>
-              </a:rPr>
-              <a:t>8</a:t>
-            </a:r>
-          </a:p>
-        </p:txBody>
-      </p:sp>
+      </p:pic>
     </p:spTree>
     <p:extLst>
       <p:ext uri="{BB962C8B-B14F-4D97-AF65-F5344CB8AC3E}">
-        <p14:creationId xmlns:p14="http://schemas.microsoft.com/office/powerpoint/2010/main" val="3040414361"/>
+        <p14:creationId xmlns:p14="http://schemas.microsoft.com/office/powerpoint/2010/main" val="2236282946"/>
       </p:ext>
     </p:extLst>
   </p:cSld>
@@ -28198,302 +26359,75 @@
           <a:lstStyle/>
           <a:p>
             <a:r>
+              <a:rPr lang="en-US" dirty="0"/>
+              <a:t>,,</a:t>
+            </a:r>
+            <a:r>
+              <a:rPr lang="en-US" dirty="0" err="1"/>
+              <a:t>Nanoavionics</a:t>
+            </a:r>
+            <a:r>
+              <a:rPr lang="en-US" dirty="0"/>
+              <a:t>”</a:t>
+            </a:r>
+            <a:r>
               <a:rPr lang="lt-LT" dirty="0"/>
-              <a:t>Vibracijos testai</a:t>
-            </a:r>
-          </a:p>
-        </p:txBody>
-      </p:sp>
-      <p:sp>
-        <p:nvSpPr>
-          <p:cNvPr id="3" name="Text Placeholder 3">
-            <a:extLst>
-              <a:ext uri="{FF2B5EF4-FFF2-40B4-BE49-F238E27FC236}">
-                <a16:creationId xmlns:a16="http://schemas.microsoft.com/office/drawing/2014/main" id="{121F8870-B73B-27B6-5FF2-A04C8774E1AA}"/>
-              </a:ext>
-            </a:extLst>
-          </p:cNvPr>
-          <p:cNvSpPr txBox="1">
-            <a:spLocks/>
-          </p:cNvSpPr>
-          <p:nvPr/>
-        </p:nvSpPr>
-        <p:spPr>
-          <a:xfrm>
-            <a:off x="456339" y="1641763"/>
-            <a:ext cx="5767816" cy="3990109"/>
-          </a:xfrm>
-          <a:prstGeom prst="rect">
-            <a:avLst/>
-          </a:prstGeom>
-        </p:spPr>
-        <p:txBody>
-          <a:bodyPr anchor="b"/>
-          <a:lstStyle>
-            <a:lvl1pPr marL="0" indent="0" algn="l" defTabSz="914400" rtl="0" eaLnBrk="1" latinLnBrk="0" hangingPunct="1">
-              <a:lnSpc>
-                <a:spcPct val="110000"/>
-              </a:lnSpc>
-              <a:spcBef>
-                <a:spcPts val="0"/>
-              </a:spcBef>
-              <a:spcAft>
-                <a:spcPts val="0"/>
-              </a:spcAft>
-              <a:buFont typeface="+mj-lt"/>
-              <a:buNone/>
-              <a:defRPr sz="2200" b="1" i="0" kern="1200">
-                <a:solidFill>
-                  <a:schemeClr val="bg1"/>
-                </a:solidFill>
-                <a:latin typeface="Arial" panose="020B0604020202020204" pitchFamily="34" charset="0"/>
-                <a:ea typeface="Inter Medium" panose="020B0502030000000004" pitchFamily="34" charset="0"/>
-                <a:cs typeface="Arial" panose="020B0604020202020204" pitchFamily="34" charset="0"/>
-              </a:defRPr>
-            </a:lvl1pPr>
-            <a:lvl2pPr marL="685800" indent="-228600" algn="l" defTabSz="914400" rtl="0" eaLnBrk="1" latinLnBrk="0" hangingPunct="1">
-              <a:lnSpc>
-                <a:spcPct val="90000"/>
-              </a:lnSpc>
-              <a:spcBef>
-                <a:spcPts val="500"/>
-              </a:spcBef>
-              <a:buFont typeface="Arial" panose="020B0604020202020204" pitchFamily="34" charset="0"/>
-              <a:buChar char="•"/>
-              <a:defRPr sz="2400" kern="1200">
-                <a:solidFill>
-                  <a:schemeClr val="tx1"/>
-                </a:solidFill>
-                <a:latin typeface="+mn-lt"/>
-                <a:ea typeface="+mn-ea"/>
-                <a:cs typeface="+mn-cs"/>
-              </a:defRPr>
-            </a:lvl2pPr>
-            <a:lvl3pPr marL="1143000" indent="-228600" algn="l" defTabSz="914400" rtl="0" eaLnBrk="1" latinLnBrk="0" hangingPunct="1">
-              <a:lnSpc>
-                <a:spcPct val="90000"/>
-              </a:lnSpc>
-              <a:spcBef>
-                <a:spcPts val="500"/>
-              </a:spcBef>
-              <a:buFont typeface="Arial" panose="020B0604020202020204" pitchFamily="34" charset="0"/>
-              <a:buChar char="•"/>
-              <a:defRPr sz="2000" kern="1200">
-                <a:solidFill>
-                  <a:schemeClr val="tx1"/>
-                </a:solidFill>
-                <a:latin typeface="+mn-lt"/>
-                <a:ea typeface="+mn-ea"/>
-                <a:cs typeface="+mn-cs"/>
-              </a:defRPr>
-            </a:lvl3pPr>
-            <a:lvl4pPr marL="1600200" indent="-228600" algn="l" defTabSz="914400" rtl="0" eaLnBrk="1" latinLnBrk="0" hangingPunct="1">
-              <a:lnSpc>
-                <a:spcPct val="90000"/>
-              </a:lnSpc>
-              <a:spcBef>
-                <a:spcPts val="500"/>
-              </a:spcBef>
-              <a:buFont typeface="Arial" panose="020B0604020202020204" pitchFamily="34" charset="0"/>
-              <a:buChar char="•"/>
-              <a:defRPr sz="1800" kern="1200">
-                <a:solidFill>
-                  <a:schemeClr val="tx1"/>
-                </a:solidFill>
-                <a:latin typeface="+mn-lt"/>
-                <a:ea typeface="+mn-ea"/>
-                <a:cs typeface="+mn-cs"/>
-              </a:defRPr>
-            </a:lvl4pPr>
-            <a:lvl5pPr marL="2057400" indent="-228600" algn="l" defTabSz="914400" rtl="0" eaLnBrk="1" latinLnBrk="0" hangingPunct="1">
-              <a:lnSpc>
-                <a:spcPct val="90000"/>
-              </a:lnSpc>
-              <a:spcBef>
-                <a:spcPts val="500"/>
-              </a:spcBef>
-              <a:buFont typeface="Arial" panose="020B0604020202020204" pitchFamily="34" charset="0"/>
-              <a:buChar char="•"/>
-              <a:defRPr sz="1800" kern="1200">
-                <a:solidFill>
-                  <a:schemeClr val="tx1"/>
-                </a:solidFill>
-                <a:latin typeface="+mn-lt"/>
-                <a:ea typeface="+mn-ea"/>
-                <a:cs typeface="+mn-cs"/>
-              </a:defRPr>
-            </a:lvl5pPr>
-            <a:lvl6pPr marL="2514600" indent="-228600" algn="l" defTabSz="914400" rtl="0" eaLnBrk="1" latinLnBrk="0" hangingPunct="1">
-              <a:lnSpc>
-                <a:spcPct val="90000"/>
-              </a:lnSpc>
-              <a:spcBef>
-                <a:spcPts val="500"/>
-              </a:spcBef>
-              <a:buFont typeface="Arial" panose="020B0604020202020204" pitchFamily="34" charset="0"/>
-              <a:buChar char="•"/>
-              <a:defRPr sz="1800" kern="1200">
-                <a:solidFill>
-                  <a:schemeClr val="tx1"/>
-                </a:solidFill>
-                <a:latin typeface="+mn-lt"/>
-                <a:ea typeface="+mn-ea"/>
-                <a:cs typeface="+mn-cs"/>
-              </a:defRPr>
-            </a:lvl6pPr>
-            <a:lvl7pPr marL="2971800" indent="-228600" algn="l" defTabSz="914400" rtl="0" eaLnBrk="1" latinLnBrk="0" hangingPunct="1">
-              <a:lnSpc>
-                <a:spcPct val="90000"/>
-              </a:lnSpc>
-              <a:spcBef>
-                <a:spcPts val="500"/>
-              </a:spcBef>
-              <a:buFont typeface="Arial" panose="020B0604020202020204" pitchFamily="34" charset="0"/>
-              <a:buChar char="•"/>
-              <a:defRPr sz="1800" kern="1200">
-                <a:solidFill>
-                  <a:schemeClr val="tx1"/>
-                </a:solidFill>
-                <a:latin typeface="+mn-lt"/>
-                <a:ea typeface="+mn-ea"/>
-                <a:cs typeface="+mn-cs"/>
-              </a:defRPr>
-            </a:lvl7pPr>
-            <a:lvl8pPr marL="3429000" indent="-228600" algn="l" defTabSz="914400" rtl="0" eaLnBrk="1" latinLnBrk="0" hangingPunct="1">
-              <a:lnSpc>
-                <a:spcPct val="90000"/>
-              </a:lnSpc>
-              <a:spcBef>
-                <a:spcPts val="500"/>
-              </a:spcBef>
-              <a:buFont typeface="Arial" panose="020B0604020202020204" pitchFamily="34" charset="0"/>
-              <a:buChar char="•"/>
-              <a:defRPr sz="1800" kern="1200">
-                <a:solidFill>
-                  <a:schemeClr val="tx1"/>
-                </a:solidFill>
-                <a:latin typeface="+mn-lt"/>
-                <a:ea typeface="+mn-ea"/>
-                <a:cs typeface="+mn-cs"/>
-              </a:defRPr>
-            </a:lvl8pPr>
-            <a:lvl9pPr marL="3886200" indent="-228600" algn="l" defTabSz="914400" rtl="0" eaLnBrk="1" latinLnBrk="0" hangingPunct="1">
-              <a:lnSpc>
-                <a:spcPct val="90000"/>
-              </a:lnSpc>
-              <a:spcBef>
-                <a:spcPts val="500"/>
-              </a:spcBef>
-              <a:buFont typeface="Arial" panose="020B0604020202020204" pitchFamily="34" charset="0"/>
-              <a:buChar char="•"/>
-              <a:defRPr sz="1800" kern="1200">
-                <a:solidFill>
-                  <a:schemeClr val="tx1"/>
-                </a:solidFill>
-                <a:latin typeface="+mn-lt"/>
-                <a:ea typeface="+mn-ea"/>
-                <a:cs typeface="+mn-cs"/>
-              </a:defRPr>
-            </a:lvl9pPr>
-          </a:lstStyle>
-          <a:p>
-            <a:pPr marL="342900" indent="-342900" algn="just">
-              <a:buFont typeface="Arial" panose="020B0604020202020204" pitchFamily="34" charset="0"/>
-              <a:buChar char="•"/>
-            </a:pPr>
-            <a:r>
-              <a:rPr lang="lt-LT" b="0" dirty="0"/>
-              <a:t>Visiems pagamintiems palydovams yra vykdomi sistemos lygio mechaniniai bandymai atliekant vibracijos bandymus.</a:t>
-            </a:r>
-          </a:p>
-          <a:p>
-            <a:pPr marL="342900" indent="-342900" algn="just">
-              <a:buFont typeface="Arial" panose="020B0604020202020204" pitchFamily="34" charset="0"/>
-              <a:buChar char="•"/>
-            </a:pPr>
-            <a:r>
-              <a:rPr lang="lt-LT" b="0" dirty="0"/>
-              <a:t>Kaip vienas iš reikalavimų pavyzdžių yra natūralusis raketos virpėjimo dažnis (angl. </a:t>
-            </a:r>
-            <a:r>
-              <a:rPr lang="lt-LT" b="0" i="1" dirty="0" err="1"/>
-              <a:t>minimum</a:t>
-            </a:r>
-            <a:r>
-              <a:rPr lang="lt-LT" b="0" i="1" dirty="0"/>
-              <a:t> </a:t>
-            </a:r>
-            <a:r>
-              <a:rPr lang="lt-LT" b="0" i="1" dirty="0" err="1"/>
-              <a:t>first</a:t>
-            </a:r>
-            <a:r>
-              <a:rPr lang="lt-LT" b="0" i="1" dirty="0"/>
-              <a:t> </a:t>
-            </a:r>
-            <a:r>
-              <a:rPr lang="lt-LT" b="0" i="1" dirty="0" err="1"/>
-              <a:t>natural</a:t>
-            </a:r>
-            <a:r>
-              <a:rPr lang="lt-LT" b="0" i="1" dirty="0"/>
-              <a:t> </a:t>
-            </a:r>
-            <a:r>
-              <a:rPr lang="lt-LT" b="0" i="1" dirty="0" err="1"/>
-              <a:t>frequency</a:t>
-            </a:r>
-            <a:r>
-              <a:rPr lang="lt-LT" b="0" dirty="0"/>
-              <a:t>). </a:t>
-            </a:r>
-          </a:p>
-          <a:p>
-            <a:pPr marL="342900" indent="-342900" algn="just">
-              <a:buFont typeface="Arial" panose="020B0604020202020204" pitchFamily="34" charset="0"/>
-              <a:buChar char="•"/>
-            </a:pPr>
-            <a:r>
-              <a:rPr lang="lt-LT" b="0" dirty="0"/>
-              <a:t>Detaliau vibracijos testai naudojami imituojant žemo dažnio virpesius, kuriuos sukelia raketa paleidimo metu.</a:t>
+              <a:t> įmonės praktikos</a:t>
             </a:r>
           </a:p>
         </p:txBody>
       </p:sp>
       <p:pic>
         <p:nvPicPr>
-          <p:cNvPr id="7" name="Picture 6">
+          <p:cNvPr id="2050" name="Picture 2" descr="Satellite Snaps Wowza Space Selfie With Off-the-Shelf Camera - CNET">
             <a:extLst>
               <a:ext uri="{FF2B5EF4-FFF2-40B4-BE49-F238E27FC236}">
-                <a16:creationId xmlns:a16="http://schemas.microsoft.com/office/drawing/2014/main" id="{5D21ECCC-41FC-61C0-222E-C1C4FB61E6E6}"/>
+                <a16:creationId xmlns:a16="http://schemas.microsoft.com/office/drawing/2014/main" id="{7DFB4040-C637-7EEB-B178-9348B041508A}"/>
               </a:ext>
             </a:extLst>
           </p:cNvPr>
           <p:cNvPicPr>
-            <a:picLocks noChangeAspect="1"/>
+            <a:picLocks noChangeAspect="1" noChangeArrowheads="1"/>
           </p:cNvPicPr>
           <p:nvPr/>
         </p:nvPicPr>
         <p:blipFill>
-          <a:blip r:embed="rId2"/>
+          <a:blip r:embed="rId2">
+            <a:extLst>
+              <a:ext uri="{28A0092B-C50C-407E-A947-70E740481C1C}">
+                <a14:useLocalDpi xmlns:a14="http://schemas.microsoft.com/office/drawing/2010/main" val="0"/>
+              </a:ext>
+            </a:extLst>
+          </a:blip>
+          <a:srcRect/>
           <a:stretch>
             <a:fillRect/>
           </a:stretch>
         </p:blipFill>
-        <p:spPr>
+        <p:spPr bwMode="auto">
           <a:xfrm>
-            <a:off x="6325898" y="1693718"/>
-            <a:ext cx="5095875" cy="4969739"/>
+            <a:off x="30051" y="1660921"/>
+            <a:ext cx="9239251" cy="5197079"/>
           </a:xfrm>
           <a:prstGeom prst="rect">
             <a:avLst/>
           </a:prstGeom>
+          <a:noFill/>
+          <a:extLst>
+            <a:ext uri="{909E8E84-426E-40DD-AFC4-6F175D3DCCD1}">
+              <a14:hiddenFill xmlns:a14="http://schemas.microsoft.com/office/drawing/2010/main">
+                <a:solidFill>
+                  <a:srgbClr val="FFFFFF"/>
+                </a:solidFill>
+              </a14:hiddenFill>
+            </a:ext>
+          </a:extLst>
         </p:spPr>
       </p:pic>
     </p:spTree>
     <p:extLst>
       <p:ext uri="{BB962C8B-B14F-4D97-AF65-F5344CB8AC3E}">
-        <p14:creationId xmlns:p14="http://schemas.microsoft.com/office/powerpoint/2010/main" val="1801342797"/>
+        <p14:creationId xmlns:p14="http://schemas.microsoft.com/office/powerpoint/2010/main" val="1665262859"/>
       </p:ext>
     </p:extLst>
   </p:cSld>

</xml_diff>